<commit_message>
made updates to mockup
</commit_message>
<xml_diff>
--- a/2022.03_S2tPArchery.pptx
+++ b/2022.03_S2tPArchery.pptx
@@ -2,13 +2,13 @@
 <file path=ppt/presentation.xml><?xml version="1.0" encoding="utf-8"?>
 <p:presentation xmlns:a="http://schemas.openxmlformats.org/drawingml/2006/main" xmlns:r="http://schemas.openxmlformats.org/officeDocument/2006/relationships" xmlns:p="http://schemas.openxmlformats.org/presentationml/2006/main" saveSubsetFonts="1">
   <p:sldMasterIdLst>
-    <p:sldMasterId id="2147483660" r:id="rId1"/>
+    <p:sldMasterId id="2147483696" r:id="rId1"/>
   </p:sldMasterIdLst>
   <p:sldIdLst>
     <p:sldId id="256" r:id="rId2"/>
     <p:sldId id="257" r:id="rId3"/>
   </p:sldIdLst>
-  <p:sldSz cx="7772400" cy="10058400"/>
+  <p:sldSz cx="12801600" cy="16459200"/>
   <p:notesSz cx="6858000" cy="9144000"/>
   <p:defaultTextStyle>
     <a:defPPr>
@@ -105,7 +105,498 @@
       </a:defRPr>
     </a:lvl9pPr>
   </p:defaultTextStyle>
+  <p:extLst>
+    <p:ext uri="{EFAFB233-063F-42B5-8137-9DF3F51BA10A}">
+      <p15:sldGuideLst xmlns:p15="http://schemas.microsoft.com/office/powerpoint/2012/main"/>
+    </p:ext>
+  </p:extLst>
 </p:presentation>
+</file>
+
+<file path=ppt/revisionInfo.xml><?xml version="1.0" encoding="utf-8"?>
+<p1510:revInfo xmlns:a="http://schemas.openxmlformats.org/drawingml/2006/main" xmlns:r="http://schemas.openxmlformats.org/officeDocument/2006/relationships" xmlns:p1510="http://schemas.microsoft.com/office/powerpoint/2015/10/main">
+  <p1510:revLst>
+    <p1510:client id="{D8B90D7E-CFF3-4164-BA84-B4ED3180EA1C}" v="8" dt="2022-03-06T05:09:21.094"/>
+  </p1510:revLst>
+</p1510:revInfo>
+</file>
+
+<file path=ppt/changesInfos/changesInfo1.xml><?xml version="1.0" encoding="utf-8"?>
+<pc:chgInfo xmlns:a="http://schemas.openxmlformats.org/drawingml/2006/main" xmlns:r="http://schemas.openxmlformats.org/officeDocument/2006/relationships" xmlns:ac="http://schemas.microsoft.com/office/drawing/2013/main/command" xmlns:pc="http://schemas.microsoft.com/office/powerpoint/2013/main/command">
+  <pc:docChgLst>
+    <pc:chgData name="Danielle Jorgensen" userId="c0c540b420fd80d8" providerId="LiveId" clId="{D8B90D7E-CFF3-4164-BA84-B4ED3180EA1C}"/>
+    <pc:docChg chg="undo custSel modSld modMainMaster">
+      <pc:chgData name="Danielle Jorgensen" userId="c0c540b420fd80d8" providerId="LiveId" clId="{D8B90D7E-CFF3-4164-BA84-B4ED3180EA1C}" dt="2022-03-06T05:09:58.621" v="192" actId="1076"/>
+      <pc:docMkLst>
+        <pc:docMk/>
+      </pc:docMkLst>
+      <pc:sldChg chg="modSp mod">
+        <pc:chgData name="Danielle Jorgensen" userId="c0c540b420fd80d8" providerId="LiveId" clId="{D8B90D7E-CFF3-4164-BA84-B4ED3180EA1C}" dt="2022-03-06T05:09:58.621" v="192" actId="1076"/>
+        <pc:sldMkLst>
+          <pc:docMk/>
+          <pc:sldMk cId="118883713" sldId="256"/>
+        </pc:sldMkLst>
+        <pc:spChg chg="mod">
+          <ac:chgData name="Danielle Jorgensen" userId="c0c540b420fd80d8" providerId="LiveId" clId="{D8B90D7E-CFF3-4164-BA84-B4ED3180EA1C}" dt="2022-03-06T05:09:33.352" v="188" actId="1076"/>
+          <ac:spMkLst>
+            <pc:docMk/>
+            <pc:sldMk cId="118883713" sldId="256"/>
+            <ac:spMk id="6" creationId="{C5687456-A3AF-453D-9111-86CCF61B7DB3}"/>
+          </ac:spMkLst>
+        </pc:spChg>
+        <pc:spChg chg="mod">
+          <ac:chgData name="Danielle Jorgensen" userId="c0c540b420fd80d8" providerId="LiveId" clId="{D8B90D7E-CFF3-4164-BA84-B4ED3180EA1C}" dt="2022-03-06T05:01:14.644" v="115"/>
+          <ac:spMkLst>
+            <pc:docMk/>
+            <pc:sldMk cId="118883713" sldId="256"/>
+            <ac:spMk id="7" creationId="{8B7BD8D1-BD34-400C-BD22-2014C0291089}"/>
+          </ac:spMkLst>
+        </pc:spChg>
+        <pc:spChg chg="mod">
+          <ac:chgData name="Danielle Jorgensen" userId="c0c540b420fd80d8" providerId="LiveId" clId="{D8B90D7E-CFF3-4164-BA84-B4ED3180EA1C}" dt="2022-03-06T05:01:37.264" v="123" actId="6549"/>
+          <ac:spMkLst>
+            <pc:docMk/>
+            <pc:sldMk cId="118883713" sldId="256"/>
+            <ac:spMk id="8" creationId="{ACCE772A-FC21-402F-A736-C5A5172CC4C9}"/>
+          </ac:spMkLst>
+        </pc:spChg>
+        <pc:spChg chg="mod">
+          <ac:chgData name="Danielle Jorgensen" userId="c0c540b420fd80d8" providerId="LiveId" clId="{D8B90D7E-CFF3-4164-BA84-B4ED3180EA1C}" dt="2022-03-06T05:01:14.644" v="115"/>
+          <ac:spMkLst>
+            <pc:docMk/>
+            <pc:sldMk cId="118883713" sldId="256"/>
+            <ac:spMk id="13" creationId="{A5C85215-B0FF-4C7F-8CEB-91765BA50E22}"/>
+          </ac:spMkLst>
+        </pc:spChg>
+        <pc:spChg chg="mod">
+          <ac:chgData name="Danielle Jorgensen" userId="c0c540b420fd80d8" providerId="LiveId" clId="{D8B90D7E-CFF3-4164-BA84-B4ED3180EA1C}" dt="2022-03-06T05:09:58.621" v="192" actId="1076"/>
+          <ac:spMkLst>
+            <pc:docMk/>
+            <pc:sldMk cId="118883713" sldId="256"/>
+            <ac:spMk id="16" creationId="{DD9B50A1-B8EE-4D42-8344-253A9172F165}"/>
+          </ac:spMkLst>
+        </pc:spChg>
+        <pc:spChg chg="mod">
+          <ac:chgData name="Danielle Jorgensen" userId="c0c540b420fd80d8" providerId="LiveId" clId="{D8B90D7E-CFF3-4164-BA84-B4ED3180EA1C}" dt="2022-03-06T05:09:54.020" v="191" actId="1076"/>
+          <ac:spMkLst>
+            <pc:docMk/>
+            <pc:sldMk cId="118883713" sldId="256"/>
+            <ac:spMk id="17" creationId="{4563E2D2-1B69-44C2-84BB-E971C7D282C8}"/>
+          </ac:spMkLst>
+        </pc:spChg>
+        <pc:picChg chg="mod">
+          <ac:chgData name="Danielle Jorgensen" userId="c0c540b420fd80d8" providerId="LiveId" clId="{D8B90D7E-CFF3-4164-BA84-B4ED3180EA1C}" dt="2022-03-06T05:01:14.644" v="115"/>
+          <ac:picMkLst>
+            <pc:docMk/>
+            <pc:sldMk cId="118883713" sldId="256"/>
+            <ac:picMk id="10" creationId="{D8CEE4AF-BE1F-4C32-B2EF-8F0F603592A0}"/>
+          </ac:picMkLst>
+        </pc:picChg>
+        <pc:picChg chg="mod">
+          <ac:chgData name="Danielle Jorgensen" userId="c0c540b420fd80d8" providerId="LiveId" clId="{D8B90D7E-CFF3-4164-BA84-B4ED3180EA1C}" dt="2022-03-06T05:01:14.644" v="115"/>
+          <ac:picMkLst>
+            <pc:docMk/>
+            <pc:sldMk cId="118883713" sldId="256"/>
+            <ac:picMk id="12" creationId="{FF42EF91-9F98-4BEB-9F9F-4D75FA64FA84}"/>
+          </ac:picMkLst>
+        </pc:picChg>
+      </pc:sldChg>
+      <pc:sldChg chg="addSp modSp mod">
+        <pc:chgData name="Danielle Jorgensen" userId="c0c540b420fd80d8" providerId="LiveId" clId="{D8B90D7E-CFF3-4164-BA84-B4ED3180EA1C}" dt="2022-03-06T05:09:38.960" v="189" actId="1076"/>
+        <pc:sldMkLst>
+          <pc:docMk/>
+          <pc:sldMk cId="1924833247" sldId="257"/>
+        </pc:sldMkLst>
+        <pc:spChg chg="add mod">
+          <ac:chgData name="Danielle Jorgensen" userId="c0c540b420fd80d8" providerId="LiveId" clId="{D8B90D7E-CFF3-4164-BA84-B4ED3180EA1C}" dt="2022-03-06T05:01:14.644" v="115"/>
+          <ac:spMkLst>
+            <pc:docMk/>
+            <pc:sldMk cId="1924833247" sldId="257"/>
+            <ac:spMk id="2" creationId="{5824D8EC-1DB1-48BE-9FAF-38859149250B}"/>
+          </ac:spMkLst>
+        </pc:spChg>
+        <pc:spChg chg="mod">
+          <ac:chgData name="Danielle Jorgensen" userId="c0c540b420fd80d8" providerId="LiveId" clId="{D8B90D7E-CFF3-4164-BA84-B4ED3180EA1C}" dt="2022-03-06T05:09:38.960" v="189" actId="1076"/>
+          <ac:spMkLst>
+            <pc:docMk/>
+            <pc:sldMk cId="1924833247" sldId="257"/>
+            <ac:spMk id="6" creationId="{C5687456-A3AF-453D-9111-86CCF61B7DB3}"/>
+          </ac:spMkLst>
+        </pc:spChg>
+        <pc:spChg chg="mod">
+          <ac:chgData name="Danielle Jorgensen" userId="c0c540b420fd80d8" providerId="LiveId" clId="{D8B90D7E-CFF3-4164-BA84-B4ED3180EA1C}" dt="2022-03-06T05:01:14.644" v="115"/>
+          <ac:spMkLst>
+            <pc:docMk/>
+            <pc:sldMk cId="1924833247" sldId="257"/>
+            <ac:spMk id="7" creationId="{8B7BD8D1-BD34-400C-BD22-2014C0291089}"/>
+          </ac:spMkLst>
+        </pc:spChg>
+        <pc:spChg chg="mod">
+          <ac:chgData name="Danielle Jorgensen" userId="c0c540b420fd80d8" providerId="LiveId" clId="{D8B90D7E-CFF3-4164-BA84-B4ED3180EA1C}" dt="2022-03-06T05:01:14.644" v="115"/>
+          <ac:spMkLst>
+            <pc:docMk/>
+            <pc:sldMk cId="1924833247" sldId="257"/>
+            <ac:spMk id="8" creationId="{ACCE772A-FC21-402F-A736-C5A5172CC4C9}"/>
+          </ac:spMkLst>
+        </pc:spChg>
+        <pc:spChg chg="mod">
+          <ac:chgData name="Danielle Jorgensen" userId="c0c540b420fd80d8" providerId="LiveId" clId="{D8B90D7E-CFF3-4164-BA84-B4ED3180EA1C}" dt="2022-03-06T05:01:14.644" v="115"/>
+          <ac:spMkLst>
+            <pc:docMk/>
+            <pc:sldMk cId="1924833247" sldId="257"/>
+            <ac:spMk id="13" creationId="{A5C85215-B0FF-4C7F-8CEB-91765BA50E22}"/>
+          </ac:spMkLst>
+        </pc:spChg>
+        <pc:spChg chg="mod">
+          <ac:chgData name="Danielle Jorgensen" userId="c0c540b420fd80d8" providerId="LiveId" clId="{D8B90D7E-CFF3-4164-BA84-B4ED3180EA1C}" dt="2022-03-06T05:01:14.644" v="115"/>
+          <ac:spMkLst>
+            <pc:docMk/>
+            <pc:sldMk cId="1924833247" sldId="257"/>
+            <ac:spMk id="15" creationId="{6A890D96-C445-4D52-B9D8-328F18AC8CDF}"/>
+          </ac:spMkLst>
+        </pc:spChg>
+        <pc:spChg chg="mod">
+          <ac:chgData name="Danielle Jorgensen" userId="c0c540b420fd80d8" providerId="LiveId" clId="{D8B90D7E-CFF3-4164-BA84-B4ED3180EA1C}" dt="2022-03-06T05:01:14.644" v="115"/>
+          <ac:spMkLst>
+            <pc:docMk/>
+            <pc:sldMk cId="1924833247" sldId="257"/>
+            <ac:spMk id="19" creationId="{555D41A4-B28B-42D6-85FE-6CA682EB6235}"/>
+          </ac:spMkLst>
+        </pc:spChg>
+        <pc:spChg chg="mod">
+          <ac:chgData name="Danielle Jorgensen" userId="c0c540b420fd80d8" providerId="LiveId" clId="{D8B90D7E-CFF3-4164-BA84-B4ED3180EA1C}" dt="2022-03-06T05:01:14.644" v="115"/>
+          <ac:spMkLst>
+            <pc:docMk/>
+            <pc:sldMk cId="1924833247" sldId="257"/>
+            <ac:spMk id="20" creationId="{770788F8-C2C5-490C-8FAF-85B25953FE09}"/>
+          </ac:spMkLst>
+        </pc:spChg>
+        <pc:spChg chg="mod">
+          <ac:chgData name="Danielle Jorgensen" userId="c0c540b420fd80d8" providerId="LiveId" clId="{D8B90D7E-CFF3-4164-BA84-B4ED3180EA1C}" dt="2022-03-06T05:01:14.644" v="115"/>
+          <ac:spMkLst>
+            <pc:docMk/>
+            <pc:sldMk cId="1924833247" sldId="257"/>
+            <ac:spMk id="21" creationId="{B4F2FAA2-E202-417C-A7AC-2D5ECF1904DE}"/>
+          </ac:spMkLst>
+        </pc:spChg>
+        <pc:picChg chg="mod">
+          <ac:chgData name="Danielle Jorgensen" userId="c0c540b420fd80d8" providerId="LiveId" clId="{D8B90D7E-CFF3-4164-BA84-B4ED3180EA1C}" dt="2022-03-06T05:01:14.644" v="115"/>
+          <ac:picMkLst>
+            <pc:docMk/>
+            <pc:sldMk cId="1924833247" sldId="257"/>
+            <ac:picMk id="3" creationId="{73B114CA-F095-42AA-8624-FE398340BDF3}"/>
+          </ac:picMkLst>
+        </pc:picChg>
+        <pc:picChg chg="mod">
+          <ac:chgData name="Danielle Jorgensen" userId="c0c540b420fd80d8" providerId="LiveId" clId="{D8B90D7E-CFF3-4164-BA84-B4ED3180EA1C}" dt="2022-03-06T05:01:14.644" v="115"/>
+          <ac:picMkLst>
+            <pc:docMk/>
+            <pc:sldMk cId="1924833247" sldId="257"/>
+            <ac:picMk id="5" creationId="{8206FFDD-6F25-4A4F-9752-78A51DEBC50E}"/>
+          </ac:picMkLst>
+        </pc:picChg>
+        <pc:picChg chg="mod">
+          <ac:chgData name="Danielle Jorgensen" userId="c0c540b420fd80d8" providerId="LiveId" clId="{D8B90D7E-CFF3-4164-BA84-B4ED3180EA1C}" dt="2022-03-06T05:01:14.644" v="115"/>
+          <ac:picMkLst>
+            <pc:docMk/>
+            <pc:sldMk cId="1924833247" sldId="257"/>
+            <ac:picMk id="10" creationId="{D8CEE4AF-BE1F-4C32-B2EF-8F0F603592A0}"/>
+          </ac:picMkLst>
+        </pc:picChg>
+        <pc:picChg chg="mod">
+          <ac:chgData name="Danielle Jorgensen" userId="c0c540b420fd80d8" providerId="LiveId" clId="{D8B90D7E-CFF3-4164-BA84-B4ED3180EA1C}" dt="2022-03-06T05:01:14.644" v="115"/>
+          <ac:picMkLst>
+            <pc:docMk/>
+            <pc:sldMk cId="1924833247" sldId="257"/>
+            <ac:picMk id="11" creationId="{1A81DD11-EB16-4727-AF95-FDB32A0F4896}"/>
+          </ac:picMkLst>
+        </pc:picChg>
+        <pc:picChg chg="mod">
+          <ac:chgData name="Danielle Jorgensen" userId="c0c540b420fd80d8" providerId="LiveId" clId="{D8B90D7E-CFF3-4164-BA84-B4ED3180EA1C}" dt="2022-03-06T05:01:14.644" v="115"/>
+          <ac:picMkLst>
+            <pc:docMk/>
+            <pc:sldMk cId="1924833247" sldId="257"/>
+            <ac:picMk id="12" creationId="{FF42EF91-9F98-4BEB-9F9F-4D75FA64FA84}"/>
+          </ac:picMkLst>
+        </pc:picChg>
+      </pc:sldChg>
+      <pc:sldMasterChg chg="modSp modSldLayout">
+        <pc:chgData name="Danielle Jorgensen" userId="c0c540b420fd80d8" providerId="LiveId" clId="{D8B90D7E-CFF3-4164-BA84-B4ED3180EA1C}" dt="2022-03-06T05:01:14.644" v="115"/>
+        <pc:sldMasterMkLst>
+          <pc:docMk/>
+          <pc:sldMasterMk cId="4064225616" sldId="2147483684"/>
+        </pc:sldMasterMkLst>
+        <pc:spChg chg="mod">
+          <ac:chgData name="Danielle Jorgensen" userId="c0c540b420fd80d8" providerId="LiveId" clId="{D8B90D7E-CFF3-4164-BA84-B4ED3180EA1C}" dt="2022-03-06T05:01:14.644" v="115"/>
+          <ac:spMkLst>
+            <pc:docMk/>
+            <pc:sldMasterMk cId="4064225616" sldId="2147483684"/>
+            <ac:spMk id="2" creationId="{00000000-0000-0000-0000-000000000000}"/>
+          </ac:spMkLst>
+        </pc:spChg>
+        <pc:spChg chg="mod">
+          <ac:chgData name="Danielle Jorgensen" userId="c0c540b420fd80d8" providerId="LiveId" clId="{D8B90D7E-CFF3-4164-BA84-B4ED3180EA1C}" dt="2022-03-06T05:01:14.644" v="115"/>
+          <ac:spMkLst>
+            <pc:docMk/>
+            <pc:sldMasterMk cId="4064225616" sldId="2147483684"/>
+            <ac:spMk id="3" creationId="{00000000-0000-0000-0000-000000000000}"/>
+          </ac:spMkLst>
+        </pc:spChg>
+        <pc:spChg chg="mod">
+          <ac:chgData name="Danielle Jorgensen" userId="c0c540b420fd80d8" providerId="LiveId" clId="{D8B90D7E-CFF3-4164-BA84-B4ED3180EA1C}" dt="2022-03-06T05:01:14.644" v="115"/>
+          <ac:spMkLst>
+            <pc:docMk/>
+            <pc:sldMasterMk cId="4064225616" sldId="2147483684"/>
+            <ac:spMk id="4" creationId="{00000000-0000-0000-0000-000000000000}"/>
+          </ac:spMkLst>
+        </pc:spChg>
+        <pc:spChg chg="mod">
+          <ac:chgData name="Danielle Jorgensen" userId="c0c540b420fd80d8" providerId="LiveId" clId="{D8B90D7E-CFF3-4164-BA84-B4ED3180EA1C}" dt="2022-03-06T05:01:14.644" v="115"/>
+          <ac:spMkLst>
+            <pc:docMk/>
+            <pc:sldMasterMk cId="4064225616" sldId="2147483684"/>
+            <ac:spMk id="5" creationId="{00000000-0000-0000-0000-000000000000}"/>
+          </ac:spMkLst>
+        </pc:spChg>
+        <pc:spChg chg="mod">
+          <ac:chgData name="Danielle Jorgensen" userId="c0c540b420fd80d8" providerId="LiveId" clId="{D8B90D7E-CFF3-4164-BA84-B4ED3180EA1C}" dt="2022-03-06T05:01:14.644" v="115"/>
+          <ac:spMkLst>
+            <pc:docMk/>
+            <pc:sldMasterMk cId="4064225616" sldId="2147483684"/>
+            <ac:spMk id="6" creationId="{00000000-0000-0000-0000-000000000000}"/>
+          </ac:spMkLst>
+        </pc:spChg>
+        <pc:sldLayoutChg chg="modSp">
+          <pc:chgData name="Danielle Jorgensen" userId="c0c540b420fd80d8" providerId="LiveId" clId="{D8B90D7E-CFF3-4164-BA84-B4ED3180EA1C}" dt="2022-03-06T05:01:14.644" v="115"/>
+          <pc:sldLayoutMkLst>
+            <pc:docMk/>
+            <pc:sldMasterMk cId="4064225616" sldId="2147483684"/>
+            <pc:sldLayoutMk cId="3651979417" sldId="2147483685"/>
+          </pc:sldLayoutMkLst>
+          <pc:spChg chg="mod">
+            <ac:chgData name="Danielle Jorgensen" userId="c0c540b420fd80d8" providerId="LiveId" clId="{D8B90D7E-CFF3-4164-BA84-B4ED3180EA1C}" dt="2022-03-06T05:01:14.644" v="115"/>
+            <ac:spMkLst>
+              <pc:docMk/>
+              <pc:sldMasterMk cId="4064225616" sldId="2147483684"/>
+              <pc:sldLayoutMk cId="3651979417" sldId="2147483685"/>
+              <ac:spMk id="2" creationId="{00000000-0000-0000-0000-000000000000}"/>
+            </ac:spMkLst>
+          </pc:spChg>
+          <pc:spChg chg="mod">
+            <ac:chgData name="Danielle Jorgensen" userId="c0c540b420fd80d8" providerId="LiveId" clId="{D8B90D7E-CFF3-4164-BA84-B4ED3180EA1C}" dt="2022-03-06T05:01:14.644" v="115"/>
+            <ac:spMkLst>
+              <pc:docMk/>
+              <pc:sldMasterMk cId="4064225616" sldId="2147483684"/>
+              <pc:sldLayoutMk cId="3651979417" sldId="2147483685"/>
+              <ac:spMk id="3" creationId="{00000000-0000-0000-0000-000000000000}"/>
+            </ac:spMkLst>
+          </pc:spChg>
+        </pc:sldLayoutChg>
+        <pc:sldLayoutChg chg="modSp">
+          <pc:chgData name="Danielle Jorgensen" userId="c0c540b420fd80d8" providerId="LiveId" clId="{D8B90D7E-CFF3-4164-BA84-B4ED3180EA1C}" dt="2022-03-06T05:01:14.644" v="115"/>
+          <pc:sldLayoutMkLst>
+            <pc:docMk/>
+            <pc:sldMasterMk cId="4064225616" sldId="2147483684"/>
+            <pc:sldLayoutMk cId="1332422429" sldId="2147483687"/>
+          </pc:sldLayoutMkLst>
+          <pc:spChg chg="mod">
+            <ac:chgData name="Danielle Jorgensen" userId="c0c540b420fd80d8" providerId="LiveId" clId="{D8B90D7E-CFF3-4164-BA84-B4ED3180EA1C}" dt="2022-03-06T05:01:14.644" v="115"/>
+            <ac:spMkLst>
+              <pc:docMk/>
+              <pc:sldMasterMk cId="4064225616" sldId="2147483684"/>
+              <pc:sldLayoutMk cId="1332422429" sldId="2147483687"/>
+              <ac:spMk id="2" creationId="{00000000-0000-0000-0000-000000000000}"/>
+            </ac:spMkLst>
+          </pc:spChg>
+          <pc:spChg chg="mod">
+            <ac:chgData name="Danielle Jorgensen" userId="c0c540b420fd80d8" providerId="LiveId" clId="{D8B90D7E-CFF3-4164-BA84-B4ED3180EA1C}" dt="2022-03-06T05:01:14.644" v="115"/>
+            <ac:spMkLst>
+              <pc:docMk/>
+              <pc:sldMasterMk cId="4064225616" sldId="2147483684"/>
+              <pc:sldLayoutMk cId="1332422429" sldId="2147483687"/>
+              <ac:spMk id="3" creationId="{00000000-0000-0000-0000-000000000000}"/>
+            </ac:spMkLst>
+          </pc:spChg>
+        </pc:sldLayoutChg>
+        <pc:sldLayoutChg chg="modSp">
+          <pc:chgData name="Danielle Jorgensen" userId="c0c540b420fd80d8" providerId="LiveId" clId="{D8B90D7E-CFF3-4164-BA84-B4ED3180EA1C}" dt="2022-03-06T05:01:14.644" v="115"/>
+          <pc:sldLayoutMkLst>
+            <pc:docMk/>
+            <pc:sldMasterMk cId="4064225616" sldId="2147483684"/>
+            <pc:sldLayoutMk cId="2449643609" sldId="2147483688"/>
+          </pc:sldLayoutMkLst>
+          <pc:spChg chg="mod">
+            <ac:chgData name="Danielle Jorgensen" userId="c0c540b420fd80d8" providerId="LiveId" clId="{D8B90D7E-CFF3-4164-BA84-B4ED3180EA1C}" dt="2022-03-06T05:01:14.644" v="115"/>
+            <ac:spMkLst>
+              <pc:docMk/>
+              <pc:sldMasterMk cId="4064225616" sldId="2147483684"/>
+              <pc:sldLayoutMk cId="2449643609" sldId="2147483688"/>
+              <ac:spMk id="3" creationId="{00000000-0000-0000-0000-000000000000}"/>
+            </ac:spMkLst>
+          </pc:spChg>
+          <pc:spChg chg="mod">
+            <ac:chgData name="Danielle Jorgensen" userId="c0c540b420fd80d8" providerId="LiveId" clId="{D8B90D7E-CFF3-4164-BA84-B4ED3180EA1C}" dt="2022-03-06T05:01:14.644" v="115"/>
+            <ac:spMkLst>
+              <pc:docMk/>
+              <pc:sldMasterMk cId="4064225616" sldId="2147483684"/>
+              <pc:sldLayoutMk cId="2449643609" sldId="2147483688"/>
+              <ac:spMk id="4" creationId="{00000000-0000-0000-0000-000000000000}"/>
+            </ac:spMkLst>
+          </pc:spChg>
+        </pc:sldLayoutChg>
+        <pc:sldLayoutChg chg="modSp">
+          <pc:chgData name="Danielle Jorgensen" userId="c0c540b420fd80d8" providerId="LiveId" clId="{D8B90D7E-CFF3-4164-BA84-B4ED3180EA1C}" dt="2022-03-06T05:01:14.644" v="115"/>
+          <pc:sldLayoutMkLst>
+            <pc:docMk/>
+            <pc:sldMasterMk cId="4064225616" sldId="2147483684"/>
+            <pc:sldLayoutMk cId="210778340" sldId="2147483689"/>
+          </pc:sldLayoutMkLst>
+          <pc:spChg chg="mod">
+            <ac:chgData name="Danielle Jorgensen" userId="c0c540b420fd80d8" providerId="LiveId" clId="{D8B90D7E-CFF3-4164-BA84-B4ED3180EA1C}" dt="2022-03-06T05:01:14.644" v="115"/>
+            <ac:spMkLst>
+              <pc:docMk/>
+              <pc:sldMasterMk cId="4064225616" sldId="2147483684"/>
+              <pc:sldLayoutMk cId="210778340" sldId="2147483689"/>
+              <ac:spMk id="2" creationId="{00000000-0000-0000-0000-000000000000}"/>
+            </ac:spMkLst>
+          </pc:spChg>
+          <pc:spChg chg="mod">
+            <ac:chgData name="Danielle Jorgensen" userId="c0c540b420fd80d8" providerId="LiveId" clId="{D8B90D7E-CFF3-4164-BA84-B4ED3180EA1C}" dt="2022-03-06T05:01:14.644" v="115"/>
+            <ac:spMkLst>
+              <pc:docMk/>
+              <pc:sldMasterMk cId="4064225616" sldId="2147483684"/>
+              <pc:sldLayoutMk cId="210778340" sldId="2147483689"/>
+              <ac:spMk id="3" creationId="{00000000-0000-0000-0000-000000000000}"/>
+            </ac:spMkLst>
+          </pc:spChg>
+          <pc:spChg chg="mod">
+            <ac:chgData name="Danielle Jorgensen" userId="c0c540b420fd80d8" providerId="LiveId" clId="{D8B90D7E-CFF3-4164-BA84-B4ED3180EA1C}" dt="2022-03-06T05:01:14.644" v="115"/>
+            <ac:spMkLst>
+              <pc:docMk/>
+              <pc:sldMasterMk cId="4064225616" sldId="2147483684"/>
+              <pc:sldLayoutMk cId="210778340" sldId="2147483689"/>
+              <ac:spMk id="4" creationId="{00000000-0000-0000-0000-000000000000}"/>
+            </ac:spMkLst>
+          </pc:spChg>
+          <pc:spChg chg="mod">
+            <ac:chgData name="Danielle Jorgensen" userId="c0c540b420fd80d8" providerId="LiveId" clId="{D8B90D7E-CFF3-4164-BA84-B4ED3180EA1C}" dt="2022-03-06T05:01:14.644" v="115"/>
+            <ac:spMkLst>
+              <pc:docMk/>
+              <pc:sldMasterMk cId="4064225616" sldId="2147483684"/>
+              <pc:sldLayoutMk cId="210778340" sldId="2147483689"/>
+              <ac:spMk id="5" creationId="{00000000-0000-0000-0000-000000000000}"/>
+            </ac:spMkLst>
+          </pc:spChg>
+          <pc:spChg chg="mod">
+            <ac:chgData name="Danielle Jorgensen" userId="c0c540b420fd80d8" providerId="LiveId" clId="{D8B90D7E-CFF3-4164-BA84-B4ED3180EA1C}" dt="2022-03-06T05:01:14.644" v="115"/>
+            <ac:spMkLst>
+              <pc:docMk/>
+              <pc:sldMasterMk cId="4064225616" sldId="2147483684"/>
+              <pc:sldLayoutMk cId="210778340" sldId="2147483689"/>
+              <ac:spMk id="6" creationId="{00000000-0000-0000-0000-000000000000}"/>
+            </ac:spMkLst>
+          </pc:spChg>
+        </pc:sldLayoutChg>
+        <pc:sldLayoutChg chg="modSp">
+          <pc:chgData name="Danielle Jorgensen" userId="c0c540b420fd80d8" providerId="LiveId" clId="{D8B90D7E-CFF3-4164-BA84-B4ED3180EA1C}" dt="2022-03-06T05:01:14.644" v="115"/>
+          <pc:sldLayoutMkLst>
+            <pc:docMk/>
+            <pc:sldMasterMk cId="4064225616" sldId="2147483684"/>
+            <pc:sldLayoutMk cId="359585578" sldId="2147483692"/>
+          </pc:sldLayoutMkLst>
+          <pc:spChg chg="mod">
+            <ac:chgData name="Danielle Jorgensen" userId="c0c540b420fd80d8" providerId="LiveId" clId="{D8B90D7E-CFF3-4164-BA84-B4ED3180EA1C}" dt="2022-03-06T05:01:14.644" v="115"/>
+            <ac:spMkLst>
+              <pc:docMk/>
+              <pc:sldMasterMk cId="4064225616" sldId="2147483684"/>
+              <pc:sldLayoutMk cId="359585578" sldId="2147483692"/>
+              <ac:spMk id="2" creationId="{00000000-0000-0000-0000-000000000000}"/>
+            </ac:spMkLst>
+          </pc:spChg>
+          <pc:spChg chg="mod">
+            <ac:chgData name="Danielle Jorgensen" userId="c0c540b420fd80d8" providerId="LiveId" clId="{D8B90D7E-CFF3-4164-BA84-B4ED3180EA1C}" dt="2022-03-06T05:01:14.644" v="115"/>
+            <ac:spMkLst>
+              <pc:docMk/>
+              <pc:sldMasterMk cId="4064225616" sldId="2147483684"/>
+              <pc:sldLayoutMk cId="359585578" sldId="2147483692"/>
+              <ac:spMk id="3" creationId="{00000000-0000-0000-0000-000000000000}"/>
+            </ac:spMkLst>
+          </pc:spChg>
+          <pc:spChg chg="mod">
+            <ac:chgData name="Danielle Jorgensen" userId="c0c540b420fd80d8" providerId="LiveId" clId="{D8B90D7E-CFF3-4164-BA84-B4ED3180EA1C}" dt="2022-03-06T05:01:14.644" v="115"/>
+            <ac:spMkLst>
+              <pc:docMk/>
+              <pc:sldMasterMk cId="4064225616" sldId="2147483684"/>
+              <pc:sldLayoutMk cId="359585578" sldId="2147483692"/>
+              <ac:spMk id="4" creationId="{00000000-0000-0000-0000-000000000000}"/>
+            </ac:spMkLst>
+          </pc:spChg>
+        </pc:sldLayoutChg>
+        <pc:sldLayoutChg chg="modSp">
+          <pc:chgData name="Danielle Jorgensen" userId="c0c540b420fd80d8" providerId="LiveId" clId="{D8B90D7E-CFF3-4164-BA84-B4ED3180EA1C}" dt="2022-03-06T05:01:14.644" v="115"/>
+          <pc:sldLayoutMkLst>
+            <pc:docMk/>
+            <pc:sldMasterMk cId="4064225616" sldId="2147483684"/>
+            <pc:sldLayoutMk cId="2120214263" sldId="2147483693"/>
+          </pc:sldLayoutMkLst>
+          <pc:spChg chg="mod">
+            <ac:chgData name="Danielle Jorgensen" userId="c0c540b420fd80d8" providerId="LiveId" clId="{D8B90D7E-CFF3-4164-BA84-B4ED3180EA1C}" dt="2022-03-06T05:01:14.644" v="115"/>
+            <ac:spMkLst>
+              <pc:docMk/>
+              <pc:sldMasterMk cId="4064225616" sldId="2147483684"/>
+              <pc:sldLayoutMk cId="2120214263" sldId="2147483693"/>
+              <ac:spMk id="2" creationId="{00000000-0000-0000-0000-000000000000}"/>
+            </ac:spMkLst>
+          </pc:spChg>
+          <pc:spChg chg="mod">
+            <ac:chgData name="Danielle Jorgensen" userId="c0c540b420fd80d8" providerId="LiveId" clId="{D8B90D7E-CFF3-4164-BA84-B4ED3180EA1C}" dt="2022-03-06T05:01:14.644" v="115"/>
+            <ac:spMkLst>
+              <pc:docMk/>
+              <pc:sldMasterMk cId="4064225616" sldId="2147483684"/>
+              <pc:sldLayoutMk cId="2120214263" sldId="2147483693"/>
+              <ac:spMk id="3" creationId="{00000000-0000-0000-0000-000000000000}"/>
+            </ac:spMkLst>
+          </pc:spChg>
+          <pc:spChg chg="mod">
+            <ac:chgData name="Danielle Jorgensen" userId="c0c540b420fd80d8" providerId="LiveId" clId="{D8B90D7E-CFF3-4164-BA84-B4ED3180EA1C}" dt="2022-03-06T05:01:14.644" v="115"/>
+            <ac:spMkLst>
+              <pc:docMk/>
+              <pc:sldMasterMk cId="4064225616" sldId="2147483684"/>
+              <pc:sldLayoutMk cId="2120214263" sldId="2147483693"/>
+              <ac:spMk id="4" creationId="{00000000-0000-0000-0000-000000000000}"/>
+            </ac:spMkLst>
+          </pc:spChg>
+        </pc:sldLayoutChg>
+        <pc:sldLayoutChg chg="modSp">
+          <pc:chgData name="Danielle Jorgensen" userId="c0c540b420fd80d8" providerId="LiveId" clId="{D8B90D7E-CFF3-4164-BA84-B4ED3180EA1C}" dt="2022-03-06T05:01:14.644" v="115"/>
+          <pc:sldLayoutMkLst>
+            <pc:docMk/>
+            <pc:sldMasterMk cId="4064225616" sldId="2147483684"/>
+            <pc:sldLayoutMk cId="527673977" sldId="2147483695"/>
+          </pc:sldLayoutMkLst>
+          <pc:spChg chg="mod">
+            <ac:chgData name="Danielle Jorgensen" userId="c0c540b420fd80d8" providerId="LiveId" clId="{D8B90D7E-CFF3-4164-BA84-B4ED3180EA1C}" dt="2022-03-06T05:01:14.644" v="115"/>
+            <ac:spMkLst>
+              <pc:docMk/>
+              <pc:sldMasterMk cId="4064225616" sldId="2147483684"/>
+              <pc:sldLayoutMk cId="527673977" sldId="2147483695"/>
+              <ac:spMk id="2" creationId="{00000000-0000-0000-0000-000000000000}"/>
+            </ac:spMkLst>
+          </pc:spChg>
+          <pc:spChg chg="mod">
+            <ac:chgData name="Danielle Jorgensen" userId="c0c540b420fd80d8" providerId="LiveId" clId="{D8B90D7E-CFF3-4164-BA84-B4ED3180EA1C}" dt="2022-03-06T05:01:14.644" v="115"/>
+            <ac:spMkLst>
+              <pc:docMk/>
+              <pc:sldMasterMk cId="4064225616" sldId="2147483684"/>
+              <pc:sldLayoutMk cId="527673977" sldId="2147483695"/>
+              <ac:spMk id="3" creationId="{00000000-0000-0000-0000-000000000000}"/>
+            </ac:spMkLst>
+          </pc:spChg>
+        </pc:sldLayoutChg>
+      </pc:sldMasterChg>
+    </pc:docChg>
+  </pc:docChgLst>
+</pc:chgInfo>
 </file>
 
 <file path=ppt/slideLayouts/slideLayout1.xml><?xml version="1.0" encoding="utf-8"?>
@@ -137,15 +628,15 @@
         </p:nvSpPr>
         <p:spPr>
           <a:xfrm>
-            <a:off x="582930" y="1646133"/>
-            <a:ext cx="6606540" cy="3501813"/>
+            <a:off x="960120" y="2693671"/>
+            <a:ext cx="10881360" cy="5730240"/>
           </a:xfrm>
         </p:spPr>
         <p:txBody>
           <a:bodyPr anchor="b"/>
           <a:lstStyle>
             <a:lvl1pPr algn="ctr">
-              <a:defRPr sz="5100"/>
+              <a:defRPr sz="8400"/>
             </a:lvl1pPr>
           </a:lstStyle>
           <a:p>
@@ -169,8 +660,8 @@
         </p:nvSpPr>
         <p:spPr>
           <a:xfrm>
-            <a:off x="971550" y="5282989"/>
-            <a:ext cx="5829300" cy="2428451"/>
+            <a:off x="1600200" y="8644891"/>
+            <a:ext cx="9601200" cy="3973829"/>
           </a:xfrm>
         </p:spPr>
         <p:txBody>
@@ -178,39 +669,39 @@
           <a:lstStyle>
             <a:lvl1pPr marL="0" indent="0" algn="ctr">
               <a:buNone/>
-              <a:defRPr sz="2040"/>
+              <a:defRPr sz="3360"/>
             </a:lvl1pPr>
-            <a:lvl2pPr marL="388620" indent="0" algn="ctr">
-              <a:buNone/>
-              <a:defRPr sz="1700"/>
+            <a:lvl2pPr marL="640080" indent="0" algn="ctr">
+              <a:buNone/>
+              <a:defRPr sz="2800"/>
             </a:lvl2pPr>
-            <a:lvl3pPr marL="777240" indent="0" algn="ctr">
-              <a:buNone/>
-              <a:defRPr sz="1530"/>
+            <a:lvl3pPr marL="1280160" indent="0" algn="ctr">
+              <a:buNone/>
+              <a:defRPr sz="2520"/>
             </a:lvl3pPr>
-            <a:lvl4pPr marL="1165860" indent="0" algn="ctr">
-              <a:buNone/>
-              <a:defRPr sz="1360"/>
+            <a:lvl4pPr marL="1920240" indent="0" algn="ctr">
+              <a:buNone/>
+              <a:defRPr sz="2240"/>
             </a:lvl4pPr>
-            <a:lvl5pPr marL="1554480" indent="0" algn="ctr">
-              <a:buNone/>
-              <a:defRPr sz="1360"/>
+            <a:lvl5pPr marL="2560320" indent="0" algn="ctr">
+              <a:buNone/>
+              <a:defRPr sz="2240"/>
             </a:lvl5pPr>
-            <a:lvl6pPr marL="1943100" indent="0" algn="ctr">
-              <a:buNone/>
-              <a:defRPr sz="1360"/>
+            <a:lvl6pPr marL="3200400" indent="0" algn="ctr">
+              <a:buNone/>
+              <a:defRPr sz="2240"/>
             </a:lvl6pPr>
-            <a:lvl7pPr marL="2331720" indent="0" algn="ctr">
-              <a:buNone/>
-              <a:defRPr sz="1360"/>
+            <a:lvl7pPr marL="3840480" indent="0" algn="ctr">
+              <a:buNone/>
+              <a:defRPr sz="2240"/>
             </a:lvl7pPr>
-            <a:lvl8pPr marL="2720340" indent="0" algn="ctr">
-              <a:buNone/>
-              <a:defRPr sz="1360"/>
+            <a:lvl8pPr marL="4480560" indent="0" algn="ctr">
+              <a:buNone/>
+              <a:defRPr sz="2240"/>
             </a:lvl8pPr>
-            <a:lvl9pPr marL="3108960" indent="0" algn="ctr">
-              <a:buNone/>
-              <a:defRPr sz="1360"/>
+            <a:lvl9pPr marL="5120640" indent="0" algn="ctr">
+              <a:buNone/>
+              <a:defRPr sz="2240"/>
             </a:lvl9pPr>
           </a:lstStyle>
           <a:p>
@@ -239,7 +730,7 @@
           <a:p>
             <a:fld id="{166BD90A-88EB-4516-B3EE-FCBB32D31494}" type="datetimeFigureOut">
               <a:rPr lang="en-US" smtClean="0"/>
-              <a:t>3/3/2022</a:t>
+              <a:t>3/5/2022</a:t>
             </a:fld>
             <a:endParaRPr lang="en-US"/>
           </a:p>
@@ -290,7 +781,7 @@
     </p:spTree>
     <p:extLst>
       <p:ext uri="{BB962C8B-B14F-4D97-AF65-F5344CB8AC3E}">
-        <p14:creationId xmlns:p14="http://schemas.microsoft.com/office/powerpoint/2010/main" val="3434779352"/>
+        <p14:creationId xmlns:p14="http://schemas.microsoft.com/office/powerpoint/2010/main" val="2275200238"/>
       </p:ext>
     </p:extLst>
   </p:cSld>
@@ -409,7 +900,7 @@
           <a:p>
             <a:fld id="{166BD90A-88EB-4516-B3EE-FCBB32D31494}" type="datetimeFigureOut">
               <a:rPr lang="en-US" smtClean="0"/>
-              <a:t>3/3/2022</a:t>
+              <a:t>3/5/2022</a:t>
             </a:fld>
             <a:endParaRPr lang="en-US"/>
           </a:p>
@@ -460,7 +951,7 @@
     </p:spTree>
     <p:extLst>
       <p:ext uri="{BB962C8B-B14F-4D97-AF65-F5344CB8AC3E}">
-        <p14:creationId xmlns:p14="http://schemas.microsoft.com/office/powerpoint/2010/main" val="2346756941"/>
+        <p14:creationId xmlns:p14="http://schemas.microsoft.com/office/powerpoint/2010/main" val="1552280276"/>
       </p:ext>
     </p:extLst>
   </p:cSld>
@@ -499,8 +990,8 @@
         </p:nvSpPr>
         <p:spPr>
           <a:xfrm>
-            <a:off x="5562124" y="535517"/>
-            <a:ext cx="1675924" cy="8524029"/>
+            <a:off x="9161146" y="876300"/>
+            <a:ext cx="2760345" cy="13948411"/>
           </a:xfrm>
         </p:spPr>
         <p:txBody>
@@ -527,8 +1018,8 @@
         </p:nvSpPr>
         <p:spPr>
           <a:xfrm>
-            <a:off x="534353" y="535517"/>
-            <a:ext cx="4930616" cy="8524029"/>
+            <a:off x="880111" y="876300"/>
+            <a:ext cx="8121015" cy="13948411"/>
           </a:xfrm>
         </p:spPr>
         <p:txBody>
@@ -589,7 +1080,7 @@
           <a:p>
             <a:fld id="{166BD90A-88EB-4516-B3EE-FCBB32D31494}" type="datetimeFigureOut">
               <a:rPr lang="en-US" smtClean="0"/>
-              <a:t>3/3/2022</a:t>
+              <a:t>3/5/2022</a:t>
             </a:fld>
             <a:endParaRPr lang="en-US"/>
           </a:p>
@@ -640,7 +1131,7 @@
     </p:spTree>
     <p:extLst>
       <p:ext uri="{BB962C8B-B14F-4D97-AF65-F5344CB8AC3E}">
-        <p14:creationId xmlns:p14="http://schemas.microsoft.com/office/powerpoint/2010/main" val="1063670084"/>
+        <p14:creationId xmlns:p14="http://schemas.microsoft.com/office/powerpoint/2010/main" val="1169224668"/>
       </p:ext>
     </p:extLst>
   </p:cSld>
@@ -759,7 +1250,7 @@
           <a:p>
             <a:fld id="{166BD90A-88EB-4516-B3EE-FCBB32D31494}" type="datetimeFigureOut">
               <a:rPr lang="en-US" smtClean="0"/>
-              <a:t>3/3/2022</a:t>
+              <a:t>3/5/2022</a:t>
             </a:fld>
             <a:endParaRPr lang="en-US"/>
           </a:p>
@@ -810,7 +1301,7 @@
     </p:spTree>
     <p:extLst>
       <p:ext uri="{BB962C8B-B14F-4D97-AF65-F5344CB8AC3E}">
-        <p14:creationId xmlns:p14="http://schemas.microsoft.com/office/powerpoint/2010/main" val="3223355781"/>
+        <p14:creationId xmlns:p14="http://schemas.microsoft.com/office/powerpoint/2010/main" val="597981227"/>
       </p:ext>
     </p:extLst>
   </p:cSld>
@@ -849,15 +1340,15 @@
         </p:nvSpPr>
         <p:spPr>
           <a:xfrm>
-            <a:off x="530305" y="2507618"/>
-            <a:ext cx="6703695" cy="4184014"/>
+            <a:off x="873443" y="4103375"/>
+            <a:ext cx="11041380" cy="6846569"/>
           </a:xfrm>
         </p:spPr>
         <p:txBody>
           <a:bodyPr anchor="b"/>
           <a:lstStyle>
             <a:lvl1pPr>
-              <a:defRPr sz="5100"/>
+              <a:defRPr sz="8400"/>
             </a:lvl1pPr>
           </a:lstStyle>
           <a:p>
@@ -881,8 +1372,8 @@
         </p:nvSpPr>
         <p:spPr>
           <a:xfrm>
-            <a:off x="530305" y="6731215"/>
-            <a:ext cx="6703695" cy="2200274"/>
+            <a:off x="873443" y="11014715"/>
+            <a:ext cx="11041380" cy="3600449"/>
           </a:xfrm>
         </p:spPr>
         <p:txBody>
@@ -890,15 +1381,15 @@
           <a:lstStyle>
             <a:lvl1pPr marL="0" indent="0">
               <a:buNone/>
-              <a:defRPr sz="2040">
+              <a:defRPr sz="3360">
                 <a:solidFill>
                   <a:schemeClr val="tx1"/>
                 </a:solidFill>
               </a:defRPr>
             </a:lvl1pPr>
-            <a:lvl2pPr marL="388620" indent="0">
-              <a:buNone/>
-              <a:defRPr sz="1700">
+            <a:lvl2pPr marL="640080" indent="0">
+              <a:buNone/>
+              <a:defRPr sz="2800">
                 <a:solidFill>
                   <a:schemeClr val="tx1">
                     <a:tint val="75000"/>
@@ -906,9 +1397,9 @@
                 </a:solidFill>
               </a:defRPr>
             </a:lvl2pPr>
-            <a:lvl3pPr marL="777240" indent="0">
-              <a:buNone/>
-              <a:defRPr sz="1530">
+            <a:lvl3pPr marL="1280160" indent="0">
+              <a:buNone/>
+              <a:defRPr sz="2520">
                 <a:solidFill>
                   <a:schemeClr val="tx1">
                     <a:tint val="75000"/>
@@ -916,9 +1407,9 @@
                 </a:solidFill>
               </a:defRPr>
             </a:lvl3pPr>
-            <a:lvl4pPr marL="1165860" indent="0">
-              <a:buNone/>
-              <a:defRPr sz="1360">
+            <a:lvl4pPr marL="1920240" indent="0">
+              <a:buNone/>
+              <a:defRPr sz="2240">
                 <a:solidFill>
                   <a:schemeClr val="tx1">
                     <a:tint val="75000"/>
@@ -926,9 +1417,9 @@
                 </a:solidFill>
               </a:defRPr>
             </a:lvl4pPr>
-            <a:lvl5pPr marL="1554480" indent="0">
-              <a:buNone/>
-              <a:defRPr sz="1360">
+            <a:lvl5pPr marL="2560320" indent="0">
+              <a:buNone/>
+              <a:defRPr sz="2240">
                 <a:solidFill>
                   <a:schemeClr val="tx1">
                     <a:tint val="75000"/>
@@ -936,9 +1427,9 @@
                 </a:solidFill>
               </a:defRPr>
             </a:lvl5pPr>
-            <a:lvl6pPr marL="1943100" indent="0">
-              <a:buNone/>
-              <a:defRPr sz="1360">
+            <a:lvl6pPr marL="3200400" indent="0">
+              <a:buNone/>
+              <a:defRPr sz="2240">
                 <a:solidFill>
                   <a:schemeClr val="tx1">
                     <a:tint val="75000"/>
@@ -946,9 +1437,9 @@
                 </a:solidFill>
               </a:defRPr>
             </a:lvl6pPr>
-            <a:lvl7pPr marL="2331720" indent="0">
-              <a:buNone/>
-              <a:defRPr sz="1360">
+            <a:lvl7pPr marL="3840480" indent="0">
+              <a:buNone/>
+              <a:defRPr sz="2240">
                 <a:solidFill>
                   <a:schemeClr val="tx1">
                     <a:tint val="75000"/>
@@ -956,9 +1447,9 @@
                 </a:solidFill>
               </a:defRPr>
             </a:lvl7pPr>
-            <a:lvl8pPr marL="2720340" indent="0">
-              <a:buNone/>
-              <a:defRPr sz="1360">
+            <a:lvl8pPr marL="4480560" indent="0">
+              <a:buNone/>
+              <a:defRPr sz="2240">
                 <a:solidFill>
                   <a:schemeClr val="tx1">
                     <a:tint val="75000"/>
@@ -966,9 +1457,9 @@
                 </a:solidFill>
               </a:defRPr>
             </a:lvl8pPr>
-            <a:lvl9pPr marL="3108960" indent="0">
-              <a:buNone/>
-              <a:defRPr sz="1360">
+            <a:lvl9pPr marL="5120640" indent="0">
+              <a:buNone/>
+              <a:defRPr sz="2240">
                 <a:solidFill>
                   <a:schemeClr val="tx1">
                     <a:tint val="75000"/>
@@ -1003,7 +1494,7 @@
           <a:p>
             <a:fld id="{166BD90A-88EB-4516-B3EE-FCBB32D31494}" type="datetimeFigureOut">
               <a:rPr lang="en-US" smtClean="0"/>
-              <a:t>3/3/2022</a:t>
+              <a:t>3/5/2022</a:t>
             </a:fld>
             <a:endParaRPr lang="en-US"/>
           </a:p>
@@ -1054,7 +1545,7 @@
     </p:spTree>
     <p:extLst>
       <p:ext uri="{BB962C8B-B14F-4D97-AF65-F5344CB8AC3E}">
-        <p14:creationId xmlns:p14="http://schemas.microsoft.com/office/powerpoint/2010/main" val="3212165318"/>
+        <p14:creationId xmlns:p14="http://schemas.microsoft.com/office/powerpoint/2010/main" val="1389790188"/>
       </p:ext>
     </p:extLst>
   </p:cSld>
@@ -1116,8 +1607,8 @@
         </p:nvSpPr>
         <p:spPr>
           <a:xfrm>
-            <a:off x="534353" y="2677584"/>
-            <a:ext cx="3303270" cy="6381962"/>
+            <a:off x="880110" y="4381500"/>
+            <a:ext cx="5440680" cy="10443211"/>
           </a:xfrm>
         </p:spPr>
         <p:txBody>
@@ -1173,8 +1664,8 @@
         </p:nvSpPr>
         <p:spPr>
           <a:xfrm>
-            <a:off x="3934778" y="2677584"/>
-            <a:ext cx="3303270" cy="6381962"/>
+            <a:off x="6480810" y="4381500"/>
+            <a:ext cx="5440680" cy="10443211"/>
           </a:xfrm>
         </p:spPr>
         <p:txBody>
@@ -1235,7 +1726,7 @@
           <a:p>
             <a:fld id="{166BD90A-88EB-4516-B3EE-FCBB32D31494}" type="datetimeFigureOut">
               <a:rPr lang="en-US" smtClean="0"/>
-              <a:t>3/3/2022</a:t>
+              <a:t>3/5/2022</a:t>
             </a:fld>
             <a:endParaRPr lang="en-US"/>
           </a:p>
@@ -1286,7 +1777,7 @@
     </p:spTree>
     <p:extLst>
       <p:ext uri="{BB962C8B-B14F-4D97-AF65-F5344CB8AC3E}">
-        <p14:creationId xmlns:p14="http://schemas.microsoft.com/office/powerpoint/2010/main" val="1130325885"/>
+        <p14:creationId xmlns:p14="http://schemas.microsoft.com/office/powerpoint/2010/main" val="59471282"/>
       </p:ext>
     </p:extLst>
   </p:cSld>
@@ -1325,8 +1816,8 @@
         </p:nvSpPr>
         <p:spPr>
           <a:xfrm>
-            <a:off x="535365" y="535519"/>
-            <a:ext cx="6703695" cy="1944159"/>
+            <a:off x="881777" y="876304"/>
+            <a:ext cx="11041380" cy="3181351"/>
           </a:xfrm>
         </p:spPr>
         <p:txBody>
@@ -1353,8 +1844,8 @@
         </p:nvSpPr>
         <p:spPr>
           <a:xfrm>
-            <a:off x="535366" y="2465706"/>
-            <a:ext cx="3288089" cy="1208404"/>
+            <a:off x="881779" y="4034791"/>
+            <a:ext cx="5415676" cy="1977389"/>
           </a:xfrm>
         </p:spPr>
         <p:txBody>
@@ -1362,39 +1853,39 @@
           <a:lstStyle>
             <a:lvl1pPr marL="0" indent="0">
               <a:buNone/>
-              <a:defRPr sz="2040" b="1"/>
+              <a:defRPr sz="3360" b="1"/>
             </a:lvl1pPr>
-            <a:lvl2pPr marL="388620" indent="0">
-              <a:buNone/>
-              <a:defRPr sz="1700" b="1"/>
+            <a:lvl2pPr marL="640080" indent="0">
+              <a:buNone/>
+              <a:defRPr sz="2800" b="1"/>
             </a:lvl2pPr>
-            <a:lvl3pPr marL="777240" indent="0">
-              <a:buNone/>
-              <a:defRPr sz="1530" b="1"/>
+            <a:lvl3pPr marL="1280160" indent="0">
+              <a:buNone/>
+              <a:defRPr sz="2520" b="1"/>
             </a:lvl3pPr>
-            <a:lvl4pPr marL="1165860" indent="0">
-              <a:buNone/>
-              <a:defRPr sz="1360" b="1"/>
+            <a:lvl4pPr marL="1920240" indent="0">
+              <a:buNone/>
+              <a:defRPr sz="2240" b="1"/>
             </a:lvl4pPr>
-            <a:lvl5pPr marL="1554480" indent="0">
-              <a:buNone/>
-              <a:defRPr sz="1360" b="1"/>
+            <a:lvl5pPr marL="2560320" indent="0">
+              <a:buNone/>
+              <a:defRPr sz="2240" b="1"/>
             </a:lvl5pPr>
-            <a:lvl6pPr marL="1943100" indent="0">
-              <a:buNone/>
-              <a:defRPr sz="1360" b="1"/>
+            <a:lvl6pPr marL="3200400" indent="0">
+              <a:buNone/>
+              <a:defRPr sz="2240" b="1"/>
             </a:lvl6pPr>
-            <a:lvl7pPr marL="2331720" indent="0">
-              <a:buNone/>
-              <a:defRPr sz="1360" b="1"/>
+            <a:lvl7pPr marL="3840480" indent="0">
+              <a:buNone/>
+              <a:defRPr sz="2240" b="1"/>
             </a:lvl7pPr>
-            <a:lvl8pPr marL="2720340" indent="0">
-              <a:buNone/>
-              <a:defRPr sz="1360" b="1"/>
+            <a:lvl8pPr marL="4480560" indent="0">
+              <a:buNone/>
+              <a:defRPr sz="2240" b="1"/>
             </a:lvl8pPr>
-            <a:lvl9pPr marL="3108960" indent="0">
-              <a:buNone/>
-              <a:defRPr sz="1360" b="1"/>
+            <a:lvl9pPr marL="5120640" indent="0">
+              <a:buNone/>
+              <a:defRPr sz="2240" b="1"/>
             </a:lvl9pPr>
           </a:lstStyle>
           <a:p>
@@ -1418,8 +1909,8 @@
         </p:nvSpPr>
         <p:spPr>
           <a:xfrm>
-            <a:off x="535366" y="3674110"/>
-            <a:ext cx="3288089" cy="5404062"/>
+            <a:off x="881779" y="6012180"/>
+            <a:ext cx="5415676" cy="8843011"/>
           </a:xfrm>
         </p:spPr>
         <p:txBody>
@@ -1475,8 +1966,8 @@
         </p:nvSpPr>
         <p:spPr>
           <a:xfrm>
-            <a:off x="3934778" y="2465706"/>
-            <a:ext cx="3304282" cy="1208404"/>
+            <a:off x="6480811" y="4034791"/>
+            <a:ext cx="5442347" cy="1977389"/>
           </a:xfrm>
         </p:spPr>
         <p:txBody>
@@ -1484,39 +1975,39 @@
           <a:lstStyle>
             <a:lvl1pPr marL="0" indent="0">
               <a:buNone/>
-              <a:defRPr sz="2040" b="1"/>
+              <a:defRPr sz="3360" b="1"/>
             </a:lvl1pPr>
-            <a:lvl2pPr marL="388620" indent="0">
-              <a:buNone/>
-              <a:defRPr sz="1700" b="1"/>
+            <a:lvl2pPr marL="640080" indent="0">
+              <a:buNone/>
+              <a:defRPr sz="2800" b="1"/>
             </a:lvl2pPr>
-            <a:lvl3pPr marL="777240" indent="0">
-              <a:buNone/>
-              <a:defRPr sz="1530" b="1"/>
+            <a:lvl3pPr marL="1280160" indent="0">
+              <a:buNone/>
+              <a:defRPr sz="2520" b="1"/>
             </a:lvl3pPr>
-            <a:lvl4pPr marL="1165860" indent="0">
-              <a:buNone/>
-              <a:defRPr sz="1360" b="1"/>
+            <a:lvl4pPr marL="1920240" indent="0">
+              <a:buNone/>
+              <a:defRPr sz="2240" b="1"/>
             </a:lvl4pPr>
-            <a:lvl5pPr marL="1554480" indent="0">
-              <a:buNone/>
-              <a:defRPr sz="1360" b="1"/>
+            <a:lvl5pPr marL="2560320" indent="0">
+              <a:buNone/>
+              <a:defRPr sz="2240" b="1"/>
             </a:lvl5pPr>
-            <a:lvl6pPr marL="1943100" indent="0">
-              <a:buNone/>
-              <a:defRPr sz="1360" b="1"/>
+            <a:lvl6pPr marL="3200400" indent="0">
+              <a:buNone/>
+              <a:defRPr sz="2240" b="1"/>
             </a:lvl6pPr>
-            <a:lvl7pPr marL="2331720" indent="0">
-              <a:buNone/>
-              <a:defRPr sz="1360" b="1"/>
+            <a:lvl7pPr marL="3840480" indent="0">
+              <a:buNone/>
+              <a:defRPr sz="2240" b="1"/>
             </a:lvl7pPr>
-            <a:lvl8pPr marL="2720340" indent="0">
-              <a:buNone/>
-              <a:defRPr sz="1360" b="1"/>
+            <a:lvl8pPr marL="4480560" indent="0">
+              <a:buNone/>
+              <a:defRPr sz="2240" b="1"/>
             </a:lvl8pPr>
-            <a:lvl9pPr marL="3108960" indent="0">
-              <a:buNone/>
-              <a:defRPr sz="1360" b="1"/>
+            <a:lvl9pPr marL="5120640" indent="0">
+              <a:buNone/>
+              <a:defRPr sz="2240" b="1"/>
             </a:lvl9pPr>
           </a:lstStyle>
           <a:p>
@@ -1540,8 +2031,8 @@
         </p:nvSpPr>
         <p:spPr>
           <a:xfrm>
-            <a:off x="3934778" y="3674110"/>
-            <a:ext cx="3304282" cy="5404062"/>
+            <a:off x="6480811" y="6012180"/>
+            <a:ext cx="5442347" cy="8843011"/>
           </a:xfrm>
         </p:spPr>
         <p:txBody>
@@ -1602,7 +2093,7 @@
           <a:p>
             <a:fld id="{166BD90A-88EB-4516-B3EE-FCBB32D31494}" type="datetimeFigureOut">
               <a:rPr lang="en-US" smtClean="0"/>
-              <a:t>3/3/2022</a:t>
+              <a:t>3/5/2022</a:t>
             </a:fld>
             <a:endParaRPr lang="en-US"/>
           </a:p>
@@ -1653,7 +2144,7 @@
     </p:spTree>
     <p:extLst>
       <p:ext uri="{BB962C8B-B14F-4D97-AF65-F5344CB8AC3E}">
-        <p14:creationId xmlns:p14="http://schemas.microsoft.com/office/powerpoint/2010/main" val="4169526344"/>
+        <p14:creationId xmlns:p14="http://schemas.microsoft.com/office/powerpoint/2010/main" val="1076952742"/>
       </p:ext>
     </p:extLst>
   </p:cSld>
@@ -1720,7 +2211,7 @@
           <a:p>
             <a:fld id="{166BD90A-88EB-4516-B3EE-FCBB32D31494}" type="datetimeFigureOut">
               <a:rPr lang="en-US" smtClean="0"/>
-              <a:t>3/3/2022</a:t>
+              <a:t>3/5/2022</a:t>
             </a:fld>
             <a:endParaRPr lang="en-US"/>
           </a:p>
@@ -1771,7 +2262,7 @@
     </p:spTree>
     <p:extLst>
       <p:ext uri="{BB962C8B-B14F-4D97-AF65-F5344CB8AC3E}">
-        <p14:creationId xmlns:p14="http://schemas.microsoft.com/office/powerpoint/2010/main" val="1518326786"/>
+        <p14:creationId xmlns:p14="http://schemas.microsoft.com/office/powerpoint/2010/main" val="4184230692"/>
       </p:ext>
     </p:extLst>
   </p:cSld>
@@ -1815,7 +2306,7 @@
           <a:p>
             <a:fld id="{166BD90A-88EB-4516-B3EE-FCBB32D31494}" type="datetimeFigureOut">
               <a:rPr lang="en-US" smtClean="0"/>
-              <a:t>3/3/2022</a:t>
+              <a:t>3/5/2022</a:t>
             </a:fld>
             <a:endParaRPr lang="en-US"/>
           </a:p>
@@ -1866,7 +2357,7 @@
     </p:spTree>
     <p:extLst>
       <p:ext uri="{BB962C8B-B14F-4D97-AF65-F5344CB8AC3E}">
-        <p14:creationId xmlns:p14="http://schemas.microsoft.com/office/powerpoint/2010/main" val="2979270560"/>
+        <p14:creationId xmlns:p14="http://schemas.microsoft.com/office/powerpoint/2010/main" val="2605333297"/>
       </p:ext>
     </p:extLst>
   </p:cSld>
@@ -1905,15 +2396,15 @@
         </p:nvSpPr>
         <p:spPr>
           <a:xfrm>
-            <a:off x="535365" y="670560"/>
-            <a:ext cx="2506801" cy="2346960"/>
+            <a:off x="881778" y="1097280"/>
+            <a:ext cx="4128849" cy="3840480"/>
           </a:xfrm>
         </p:spPr>
         <p:txBody>
           <a:bodyPr anchor="b"/>
           <a:lstStyle>
             <a:lvl1pPr>
-              <a:defRPr sz="2720"/>
+              <a:defRPr sz="4480"/>
             </a:lvl1pPr>
           </a:lstStyle>
           <a:p>
@@ -1937,39 +2428,39 @@
         </p:nvSpPr>
         <p:spPr>
           <a:xfrm>
-            <a:off x="3304282" y="1448226"/>
-            <a:ext cx="3934778" cy="7147983"/>
+            <a:off x="5442347" y="2369824"/>
+            <a:ext cx="6480810" cy="11696700"/>
           </a:xfrm>
         </p:spPr>
         <p:txBody>
           <a:bodyPr/>
           <a:lstStyle>
             <a:lvl1pPr>
-              <a:defRPr sz="2720"/>
+              <a:defRPr sz="4480"/>
             </a:lvl1pPr>
             <a:lvl2pPr>
-              <a:defRPr sz="2380"/>
+              <a:defRPr sz="3920"/>
             </a:lvl2pPr>
             <a:lvl3pPr>
-              <a:defRPr sz="2040"/>
+              <a:defRPr sz="3360"/>
             </a:lvl3pPr>
             <a:lvl4pPr>
-              <a:defRPr sz="1700"/>
+              <a:defRPr sz="2800"/>
             </a:lvl4pPr>
             <a:lvl5pPr>
-              <a:defRPr sz="1700"/>
+              <a:defRPr sz="2800"/>
             </a:lvl5pPr>
             <a:lvl6pPr>
-              <a:defRPr sz="1700"/>
+              <a:defRPr sz="2800"/>
             </a:lvl6pPr>
             <a:lvl7pPr>
-              <a:defRPr sz="1700"/>
+              <a:defRPr sz="2800"/>
             </a:lvl7pPr>
             <a:lvl8pPr>
-              <a:defRPr sz="1700"/>
+              <a:defRPr sz="2800"/>
             </a:lvl8pPr>
             <a:lvl9pPr>
-              <a:defRPr sz="1700"/>
+              <a:defRPr sz="2800"/>
             </a:lvl9pPr>
           </a:lstStyle>
           <a:p>
@@ -2022,8 +2513,8 @@
         </p:nvSpPr>
         <p:spPr>
           <a:xfrm>
-            <a:off x="535365" y="3017520"/>
-            <a:ext cx="2506801" cy="5590329"/>
+            <a:off x="881778" y="4937760"/>
+            <a:ext cx="4128849" cy="9147811"/>
           </a:xfrm>
         </p:spPr>
         <p:txBody>
@@ -2031,39 +2522,39 @@
           <a:lstStyle>
             <a:lvl1pPr marL="0" indent="0">
               <a:buNone/>
-              <a:defRPr sz="1360"/>
+              <a:defRPr sz="2240"/>
             </a:lvl1pPr>
-            <a:lvl2pPr marL="388620" indent="0">
-              <a:buNone/>
-              <a:defRPr sz="1190"/>
+            <a:lvl2pPr marL="640080" indent="0">
+              <a:buNone/>
+              <a:defRPr sz="1960"/>
             </a:lvl2pPr>
-            <a:lvl3pPr marL="777240" indent="0">
-              <a:buNone/>
-              <a:defRPr sz="1020"/>
+            <a:lvl3pPr marL="1280160" indent="0">
+              <a:buNone/>
+              <a:defRPr sz="1680"/>
             </a:lvl3pPr>
-            <a:lvl4pPr marL="1165860" indent="0">
-              <a:buNone/>
-              <a:defRPr sz="850"/>
+            <a:lvl4pPr marL="1920240" indent="0">
+              <a:buNone/>
+              <a:defRPr sz="1400"/>
             </a:lvl4pPr>
-            <a:lvl5pPr marL="1554480" indent="0">
-              <a:buNone/>
-              <a:defRPr sz="850"/>
+            <a:lvl5pPr marL="2560320" indent="0">
+              <a:buNone/>
+              <a:defRPr sz="1400"/>
             </a:lvl5pPr>
-            <a:lvl6pPr marL="1943100" indent="0">
-              <a:buNone/>
-              <a:defRPr sz="850"/>
+            <a:lvl6pPr marL="3200400" indent="0">
+              <a:buNone/>
+              <a:defRPr sz="1400"/>
             </a:lvl6pPr>
-            <a:lvl7pPr marL="2331720" indent="0">
-              <a:buNone/>
-              <a:defRPr sz="850"/>
+            <a:lvl7pPr marL="3840480" indent="0">
+              <a:buNone/>
+              <a:defRPr sz="1400"/>
             </a:lvl7pPr>
-            <a:lvl8pPr marL="2720340" indent="0">
-              <a:buNone/>
-              <a:defRPr sz="850"/>
+            <a:lvl8pPr marL="4480560" indent="0">
+              <a:buNone/>
+              <a:defRPr sz="1400"/>
             </a:lvl8pPr>
-            <a:lvl9pPr marL="3108960" indent="0">
-              <a:buNone/>
-              <a:defRPr sz="850"/>
+            <a:lvl9pPr marL="5120640" indent="0">
+              <a:buNone/>
+              <a:defRPr sz="1400"/>
             </a:lvl9pPr>
           </a:lstStyle>
           <a:p>
@@ -2092,7 +2583,7 @@
           <a:p>
             <a:fld id="{166BD90A-88EB-4516-B3EE-FCBB32D31494}" type="datetimeFigureOut">
               <a:rPr lang="en-US" smtClean="0"/>
-              <a:t>3/3/2022</a:t>
+              <a:t>3/5/2022</a:t>
             </a:fld>
             <a:endParaRPr lang="en-US"/>
           </a:p>
@@ -2143,7 +2634,7 @@
     </p:spTree>
     <p:extLst>
       <p:ext uri="{BB962C8B-B14F-4D97-AF65-F5344CB8AC3E}">
-        <p14:creationId xmlns:p14="http://schemas.microsoft.com/office/powerpoint/2010/main" val="1738137041"/>
+        <p14:creationId xmlns:p14="http://schemas.microsoft.com/office/powerpoint/2010/main" val="2528943561"/>
       </p:ext>
     </p:extLst>
   </p:cSld>
@@ -2182,15 +2673,15 @@
         </p:nvSpPr>
         <p:spPr>
           <a:xfrm>
-            <a:off x="535365" y="670560"/>
-            <a:ext cx="2506801" cy="2346960"/>
+            <a:off x="881778" y="1097280"/>
+            <a:ext cx="4128849" cy="3840480"/>
           </a:xfrm>
         </p:spPr>
         <p:txBody>
           <a:bodyPr anchor="b"/>
           <a:lstStyle>
             <a:lvl1pPr>
-              <a:defRPr sz="2720"/>
+              <a:defRPr sz="4480"/>
             </a:lvl1pPr>
           </a:lstStyle>
           <a:p>
@@ -2214,8 +2705,8 @@
         </p:nvSpPr>
         <p:spPr>
           <a:xfrm>
-            <a:off x="3304282" y="1448226"/>
-            <a:ext cx="3934778" cy="7147983"/>
+            <a:off x="5442347" y="2369824"/>
+            <a:ext cx="6480810" cy="11696700"/>
           </a:xfrm>
         </p:spPr>
         <p:txBody>
@@ -2223,39 +2714,39 @@
           <a:lstStyle>
             <a:lvl1pPr marL="0" indent="0">
               <a:buNone/>
-              <a:defRPr sz="2720"/>
+              <a:defRPr sz="4480"/>
             </a:lvl1pPr>
-            <a:lvl2pPr marL="388620" indent="0">
-              <a:buNone/>
-              <a:defRPr sz="2380"/>
+            <a:lvl2pPr marL="640080" indent="0">
+              <a:buNone/>
+              <a:defRPr sz="3920"/>
             </a:lvl2pPr>
-            <a:lvl3pPr marL="777240" indent="0">
-              <a:buNone/>
-              <a:defRPr sz="2040"/>
+            <a:lvl3pPr marL="1280160" indent="0">
+              <a:buNone/>
+              <a:defRPr sz="3360"/>
             </a:lvl3pPr>
-            <a:lvl4pPr marL="1165860" indent="0">
-              <a:buNone/>
-              <a:defRPr sz="1700"/>
+            <a:lvl4pPr marL="1920240" indent="0">
+              <a:buNone/>
+              <a:defRPr sz="2800"/>
             </a:lvl4pPr>
-            <a:lvl5pPr marL="1554480" indent="0">
-              <a:buNone/>
-              <a:defRPr sz="1700"/>
+            <a:lvl5pPr marL="2560320" indent="0">
+              <a:buNone/>
+              <a:defRPr sz="2800"/>
             </a:lvl5pPr>
-            <a:lvl6pPr marL="1943100" indent="0">
-              <a:buNone/>
-              <a:defRPr sz="1700"/>
+            <a:lvl6pPr marL="3200400" indent="0">
+              <a:buNone/>
+              <a:defRPr sz="2800"/>
             </a:lvl6pPr>
-            <a:lvl7pPr marL="2331720" indent="0">
-              <a:buNone/>
-              <a:defRPr sz="1700"/>
+            <a:lvl7pPr marL="3840480" indent="0">
+              <a:buNone/>
+              <a:defRPr sz="2800"/>
             </a:lvl7pPr>
-            <a:lvl8pPr marL="2720340" indent="0">
-              <a:buNone/>
-              <a:defRPr sz="1700"/>
+            <a:lvl8pPr marL="4480560" indent="0">
+              <a:buNone/>
+              <a:defRPr sz="2800"/>
             </a:lvl8pPr>
-            <a:lvl9pPr marL="3108960" indent="0">
-              <a:buNone/>
-              <a:defRPr sz="1700"/>
+            <a:lvl9pPr marL="5120640" indent="0">
+              <a:buNone/>
+              <a:defRPr sz="2800"/>
             </a:lvl9pPr>
           </a:lstStyle>
           <a:p>
@@ -2279,8 +2770,8 @@
         </p:nvSpPr>
         <p:spPr>
           <a:xfrm>
-            <a:off x="535365" y="3017520"/>
-            <a:ext cx="2506801" cy="5590329"/>
+            <a:off x="881778" y="4937760"/>
+            <a:ext cx="4128849" cy="9147811"/>
           </a:xfrm>
         </p:spPr>
         <p:txBody>
@@ -2288,39 +2779,39 @@
           <a:lstStyle>
             <a:lvl1pPr marL="0" indent="0">
               <a:buNone/>
-              <a:defRPr sz="1360"/>
+              <a:defRPr sz="2240"/>
             </a:lvl1pPr>
-            <a:lvl2pPr marL="388620" indent="0">
-              <a:buNone/>
-              <a:defRPr sz="1190"/>
+            <a:lvl2pPr marL="640080" indent="0">
+              <a:buNone/>
+              <a:defRPr sz="1960"/>
             </a:lvl2pPr>
-            <a:lvl3pPr marL="777240" indent="0">
-              <a:buNone/>
-              <a:defRPr sz="1020"/>
+            <a:lvl3pPr marL="1280160" indent="0">
+              <a:buNone/>
+              <a:defRPr sz="1680"/>
             </a:lvl3pPr>
-            <a:lvl4pPr marL="1165860" indent="0">
-              <a:buNone/>
-              <a:defRPr sz="850"/>
+            <a:lvl4pPr marL="1920240" indent="0">
+              <a:buNone/>
+              <a:defRPr sz="1400"/>
             </a:lvl4pPr>
-            <a:lvl5pPr marL="1554480" indent="0">
-              <a:buNone/>
-              <a:defRPr sz="850"/>
+            <a:lvl5pPr marL="2560320" indent="0">
+              <a:buNone/>
+              <a:defRPr sz="1400"/>
             </a:lvl5pPr>
-            <a:lvl6pPr marL="1943100" indent="0">
-              <a:buNone/>
-              <a:defRPr sz="850"/>
+            <a:lvl6pPr marL="3200400" indent="0">
+              <a:buNone/>
+              <a:defRPr sz="1400"/>
             </a:lvl6pPr>
-            <a:lvl7pPr marL="2331720" indent="0">
-              <a:buNone/>
-              <a:defRPr sz="850"/>
+            <a:lvl7pPr marL="3840480" indent="0">
+              <a:buNone/>
+              <a:defRPr sz="1400"/>
             </a:lvl7pPr>
-            <a:lvl8pPr marL="2720340" indent="0">
-              <a:buNone/>
-              <a:defRPr sz="850"/>
+            <a:lvl8pPr marL="4480560" indent="0">
+              <a:buNone/>
+              <a:defRPr sz="1400"/>
             </a:lvl8pPr>
-            <a:lvl9pPr marL="3108960" indent="0">
-              <a:buNone/>
-              <a:defRPr sz="850"/>
+            <a:lvl9pPr marL="5120640" indent="0">
+              <a:buNone/>
+              <a:defRPr sz="1400"/>
             </a:lvl9pPr>
           </a:lstStyle>
           <a:p>
@@ -2349,7 +2840,7 @@
           <a:p>
             <a:fld id="{166BD90A-88EB-4516-B3EE-FCBB32D31494}" type="datetimeFigureOut">
               <a:rPr lang="en-US" smtClean="0"/>
-              <a:t>3/3/2022</a:t>
+              <a:t>3/5/2022</a:t>
             </a:fld>
             <a:endParaRPr lang="en-US"/>
           </a:p>
@@ -2400,7 +2891,7 @@
     </p:spTree>
     <p:extLst>
       <p:ext uri="{BB962C8B-B14F-4D97-AF65-F5344CB8AC3E}">
-        <p14:creationId xmlns:p14="http://schemas.microsoft.com/office/powerpoint/2010/main" val="3527170259"/>
+        <p14:creationId xmlns:p14="http://schemas.microsoft.com/office/powerpoint/2010/main" val="4117565674"/>
       </p:ext>
     </p:extLst>
   </p:cSld>
@@ -2444,8 +2935,8 @@
         </p:nvSpPr>
         <p:spPr>
           <a:xfrm>
-            <a:off x="534353" y="535519"/>
-            <a:ext cx="6703695" cy="1944159"/>
+            <a:off x="880110" y="876304"/>
+            <a:ext cx="11041380" cy="3181351"/>
           </a:xfrm>
           <a:prstGeom prst="rect">
             <a:avLst/>
@@ -2477,8 +2968,8 @@
         </p:nvSpPr>
         <p:spPr>
           <a:xfrm>
-            <a:off x="534353" y="2677584"/>
-            <a:ext cx="6703695" cy="6381962"/>
+            <a:off x="880110" y="4381500"/>
+            <a:ext cx="11041380" cy="10443211"/>
           </a:xfrm>
           <a:prstGeom prst="rect">
             <a:avLst/>
@@ -2539,8 +3030,8 @@
         </p:nvSpPr>
         <p:spPr>
           <a:xfrm>
-            <a:off x="534353" y="9322649"/>
-            <a:ext cx="1748790" cy="535517"/>
+            <a:off x="880110" y="15255244"/>
+            <a:ext cx="2880360" cy="876300"/>
           </a:xfrm>
           <a:prstGeom prst="rect">
             <a:avLst/>
@@ -2550,7 +3041,7 @@
           <a:bodyPr vert="horz" lIns="91440" tIns="45720" rIns="91440" bIns="45720" rtlCol="0" anchor="ctr"/>
           <a:lstStyle>
             <a:lvl1pPr algn="l">
-              <a:defRPr sz="1020">
+              <a:defRPr sz="1680">
                 <a:solidFill>
                   <a:schemeClr val="tx1">
                     <a:tint val="75000"/>
@@ -2562,7 +3053,7 @@
           <a:p>
             <a:fld id="{166BD90A-88EB-4516-B3EE-FCBB32D31494}" type="datetimeFigureOut">
               <a:rPr lang="en-US" smtClean="0"/>
-              <a:t>3/3/2022</a:t>
+              <a:t>3/5/2022</a:t>
             </a:fld>
             <a:endParaRPr lang="en-US"/>
           </a:p>
@@ -2580,8 +3071,8 @@
         </p:nvSpPr>
         <p:spPr>
           <a:xfrm>
-            <a:off x="2574608" y="9322649"/>
-            <a:ext cx="2623185" cy="535517"/>
+            <a:off x="4240530" y="15255244"/>
+            <a:ext cx="4320540" cy="876300"/>
           </a:xfrm>
           <a:prstGeom prst="rect">
             <a:avLst/>
@@ -2591,7 +3082,7 @@
           <a:bodyPr vert="horz" lIns="91440" tIns="45720" rIns="91440" bIns="45720" rtlCol="0" anchor="ctr"/>
           <a:lstStyle>
             <a:lvl1pPr algn="ctr">
-              <a:defRPr sz="1020">
+              <a:defRPr sz="1680">
                 <a:solidFill>
                   <a:schemeClr val="tx1">
                     <a:tint val="75000"/>
@@ -2617,8 +3108,8 @@
         </p:nvSpPr>
         <p:spPr>
           <a:xfrm>
-            <a:off x="5489258" y="9322649"/>
-            <a:ext cx="1748790" cy="535517"/>
+            <a:off x="9041130" y="15255244"/>
+            <a:ext cx="2880360" cy="876300"/>
           </a:xfrm>
           <a:prstGeom prst="rect">
             <a:avLst/>
@@ -2628,7 +3119,7 @@
           <a:bodyPr vert="horz" lIns="91440" tIns="45720" rIns="91440" bIns="45720" rtlCol="0" anchor="ctr"/>
           <a:lstStyle>
             <a:lvl1pPr algn="r">
-              <a:defRPr sz="1020">
+              <a:defRPr sz="1680">
                 <a:solidFill>
                   <a:schemeClr val="tx1">
                     <a:tint val="75000"/>
@@ -2649,27 +3140,27 @@
     </p:spTree>
     <p:extLst>
       <p:ext uri="{BB962C8B-B14F-4D97-AF65-F5344CB8AC3E}">
-        <p14:creationId xmlns:p14="http://schemas.microsoft.com/office/powerpoint/2010/main" val="3811130369"/>
+        <p14:creationId xmlns:p14="http://schemas.microsoft.com/office/powerpoint/2010/main" val="1042882547"/>
       </p:ext>
     </p:extLst>
   </p:cSld>
   <p:clrMap bg1="lt1" tx1="dk1" bg2="lt2" tx2="dk2" accent1="accent1" accent2="accent2" accent3="accent3" accent4="accent4" accent5="accent5" accent6="accent6" hlink="hlink" folHlink="folHlink"/>
   <p:sldLayoutIdLst>
-    <p:sldLayoutId id="2147483661" r:id="rId1"/>
-    <p:sldLayoutId id="2147483662" r:id="rId2"/>
-    <p:sldLayoutId id="2147483663" r:id="rId3"/>
-    <p:sldLayoutId id="2147483664" r:id="rId4"/>
-    <p:sldLayoutId id="2147483665" r:id="rId5"/>
-    <p:sldLayoutId id="2147483666" r:id="rId6"/>
-    <p:sldLayoutId id="2147483667" r:id="rId7"/>
-    <p:sldLayoutId id="2147483668" r:id="rId8"/>
-    <p:sldLayoutId id="2147483669" r:id="rId9"/>
-    <p:sldLayoutId id="2147483670" r:id="rId10"/>
-    <p:sldLayoutId id="2147483671" r:id="rId11"/>
+    <p:sldLayoutId id="2147483697" r:id="rId1"/>
+    <p:sldLayoutId id="2147483698" r:id="rId2"/>
+    <p:sldLayoutId id="2147483699" r:id="rId3"/>
+    <p:sldLayoutId id="2147483700" r:id="rId4"/>
+    <p:sldLayoutId id="2147483701" r:id="rId5"/>
+    <p:sldLayoutId id="2147483702" r:id="rId6"/>
+    <p:sldLayoutId id="2147483703" r:id="rId7"/>
+    <p:sldLayoutId id="2147483704" r:id="rId8"/>
+    <p:sldLayoutId id="2147483705" r:id="rId9"/>
+    <p:sldLayoutId id="2147483706" r:id="rId10"/>
+    <p:sldLayoutId id="2147483707" r:id="rId11"/>
   </p:sldLayoutIdLst>
   <p:txStyles>
     <p:titleStyle>
-      <a:lvl1pPr algn="l" defTabSz="777240" rtl="0" eaLnBrk="1" latinLnBrk="0" hangingPunct="1">
+      <a:lvl1pPr algn="l" defTabSz="1280160" rtl="0" eaLnBrk="1" latinLnBrk="0" hangingPunct="1">
         <a:lnSpc>
           <a:spcPct val="90000"/>
         </a:lnSpc>
@@ -2677,7 +3168,7 @@
           <a:spcPct val="0"/>
         </a:spcBef>
         <a:buNone/>
-        <a:defRPr sz="3740" kern="1200">
+        <a:defRPr sz="6160" kern="1200">
           <a:solidFill>
             <a:schemeClr val="tx1"/>
           </a:solidFill>
@@ -2688,16 +3179,16 @@
       </a:lvl1pPr>
     </p:titleStyle>
     <p:bodyStyle>
-      <a:lvl1pPr marL="194310" indent="-194310" algn="l" defTabSz="777240" rtl="0" eaLnBrk="1" latinLnBrk="0" hangingPunct="1">
+      <a:lvl1pPr marL="320040" indent="-320040" algn="l" defTabSz="1280160" rtl="0" eaLnBrk="1" latinLnBrk="0" hangingPunct="1">
         <a:lnSpc>
           <a:spcPct val="90000"/>
         </a:lnSpc>
         <a:spcBef>
-          <a:spcPts val="850"/>
+          <a:spcPts val="1400"/>
         </a:spcBef>
         <a:buFont typeface="Arial" panose="020B0604020202020204" pitchFamily="34" charset="0"/>
         <a:buChar char="•"/>
-        <a:defRPr sz="2380" kern="1200">
+        <a:defRPr sz="3920" kern="1200">
           <a:solidFill>
             <a:schemeClr val="tx1"/>
           </a:solidFill>
@@ -2706,16 +3197,16 @@
           <a:cs typeface="+mn-cs"/>
         </a:defRPr>
       </a:lvl1pPr>
-      <a:lvl2pPr marL="582930" indent="-194310" algn="l" defTabSz="777240" rtl="0" eaLnBrk="1" latinLnBrk="0" hangingPunct="1">
+      <a:lvl2pPr marL="960120" indent="-320040" algn="l" defTabSz="1280160" rtl="0" eaLnBrk="1" latinLnBrk="0" hangingPunct="1">
         <a:lnSpc>
           <a:spcPct val="90000"/>
         </a:lnSpc>
         <a:spcBef>
-          <a:spcPts val="425"/>
+          <a:spcPts val="700"/>
         </a:spcBef>
         <a:buFont typeface="Arial" panose="020B0604020202020204" pitchFamily="34" charset="0"/>
         <a:buChar char="•"/>
-        <a:defRPr sz="2040" kern="1200">
+        <a:defRPr sz="3360" kern="1200">
           <a:solidFill>
             <a:schemeClr val="tx1"/>
           </a:solidFill>
@@ -2724,16 +3215,16 @@
           <a:cs typeface="+mn-cs"/>
         </a:defRPr>
       </a:lvl2pPr>
-      <a:lvl3pPr marL="971550" indent="-194310" algn="l" defTabSz="777240" rtl="0" eaLnBrk="1" latinLnBrk="0" hangingPunct="1">
+      <a:lvl3pPr marL="1600200" indent="-320040" algn="l" defTabSz="1280160" rtl="0" eaLnBrk="1" latinLnBrk="0" hangingPunct="1">
         <a:lnSpc>
           <a:spcPct val="90000"/>
         </a:lnSpc>
         <a:spcBef>
-          <a:spcPts val="425"/>
+          <a:spcPts val="700"/>
         </a:spcBef>
         <a:buFont typeface="Arial" panose="020B0604020202020204" pitchFamily="34" charset="0"/>
         <a:buChar char="•"/>
-        <a:defRPr sz="1700" kern="1200">
+        <a:defRPr sz="2800" kern="1200">
           <a:solidFill>
             <a:schemeClr val="tx1"/>
           </a:solidFill>
@@ -2742,16 +3233,16 @@
           <a:cs typeface="+mn-cs"/>
         </a:defRPr>
       </a:lvl3pPr>
-      <a:lvl4pPr marL="1360170" indent="-194310" algn="l" defTabSz="777240" rtl="0" eaLnBrk="1" latinLnBrk="0" hangingPunct="1">
+      <a:lvl4pPr marL="2240280" indent="-320040" algn="l" defTabSz="1280160" rtl="0" eaLnBrk="1" latinLnBrk="0" hangingPunct="1">
         <a:lnSpc>
           <a:spcPct val="90000"/>
         </a:lnSpc>
         <a:spcBef>
-          <a:spcPts val="425"/>
+          <a:spcPts val="700"/>
         </a:spcBef>
         <a:buFont typeface="Arial" panose="020B0604020202020204" pitchFamily="34" charset="0"/>
         <a:buChar char="•"/>
-        <a:defRPr sz="1530" kern="1200">
+        <a:defRPr sz="2520" kern="1200">
           <a:solidFill>
             <a:schemeClr val="tx1"/>
           </a:solidFill>
@@ -2760,16 +3251,16 @@
           <a:cs typeface="+mn-cs"/>
         </a:defRPr>
       </a:lvl4pPr>
-      <a:lvl5pPr marL="1748790" indent="-194310" algn="l" defTabSz="777240" rtl="0" eaLnBrk="1" latinLnBrk="0" hangingPunct="1">
+      <a:lvl5pPr marL="2880360" indent="-320040" algn="l" defTabSz="1280160" rtl="0" eaLnBrk="1" latinLnBrk="0" hangingPunct="1">
         <a:lnSpc>
           <a:spcPct val="90000"/>
         </a:lnSpc>
         <a:spcBef>
-          <a:spcPts val="425"/>
+          <a:spcPts val="700"/>
         </a:spcBef>
         <a:buFont typeface="Arial" panose="020B0604020202020204" pitchFamily="34" charset="0"/>
         <a:buChar char="•"/>
-        <a:defRPr sz="1530" kern="1200">
+        <a:defRPr sz="2520" kern="1200">
           <a:solidFill>
             <a:schemeClr val="tx1"/>
           </a:solidFill>
@@ -2778,16 +3269,16 @@
           <a:cs typeface="+mn-cs"/>
         </a:defRPr>
       </a:lvl5pPr>
-      <a:lvl6pPr marL="2137410" indent="-194310" algn="l" defTabSz="777240" rtl="0" eaLnBrk="1" latinLnBrk="0" hangingPunct="1">
+      <a:lvl6pPr marL="3520440" indent="-320040" algn="l" defTabSz="1280160" rtl="0" eaLnBrk="1" latinLnBrk="0" hangingPunct="1">
         <a:lnSpc>
           <a:spcPct val="90000"/>
         </a:lnSpc>
         <a:spcBef>
-          <a:spcPts val="425"/>
+          <a:spcPts val="700"/>
         </a:spcBef>
         <a:buFont typeface="Arial" panose="020B0604020202020204" pitchFamily="34" charset="0"/>
         <a:buChar char="•"/>
-        <a:defRPr sz="1530" kern="1200">
+        <a:defRPr sz="2520" kern="1200">
           <a:solidFill>
             <a:schemeClr val="tx1"/>
           </a:solidFill>
@@ -2796,16 +3287,16 @@
           <a:cs typeface="+mn-cs"/>
         </a:defRPr>
       </a:lvl6pPr>
-      <a:lvl7pPr marL="2526030" indent="-194310" algn="l" defTabSz="777240" rtl="0" eaLnBrk="1" latinLnBrk="0" hangingPunct="1">
+      <a:lvl7pPr marL="4160520" indent="-320040" algn="l" defTabSz="1280160" rtl="0" eaLnBrk="1" latinLnBrk="0" hangingPunct="1">
         <a:lnSpc>
           <a:spcPct val="90000"/>
         </a:lnSpc>
         <a:spcBef>
-          <a:spcPts val="425"/>
+          <a:spcPts val="700"/>
         </a:spcBef>
         <a:buFont typeface="Arial" panose="020B0604020202020204" pitchFamily="34" charset="0"/>
         <a:buChar char="•"/>
-        <a:defRPr sz="1530" kern="1200">
+        <a:defRPr sz="2520" kern="1200">
           <a:solidFill>
             <a:schemeClr val="tx1"/>
           </a:solidFill>
@@ -2814,16 +3305,16 @@
           <a:cs typeface="+mn-cs"/>
         </a:defRPr>
       </a:lvl7pPr>
-      <a:lvl8pPr marL="2914650" indent="-194310" algn="l" defTabSz="777240" rtl="0" eaLnBrk="1" latinLnBrk="0" hangingPunct="1">
+      <a:lvl8pPr marL="4800600" indent="-320040" algn="l" defTabSz="1280160" rtl="0" eaLnBrk="1" latinLnBrk="0" hangingPunct="1">
         <a:lnSpc>
           <a:spcPct val="90000"/>
         </a:lnSpc>
         <a:spcBef>
-          <a:spcPts val="425"/>
+          <a:spcPts val="700"/>
         </a:spcBef>
         <a:buFont typeface="Arial" panose="020B0604020202020204" pitchFamily="34" charset="0"/>
         <a:buChar char="•"/>
-        <a:defRPr sz="1530" kern="1200">
+        <a:defRPr sz="2520" kern="1200">
           <a:solidFill>
             <a:schemeClr val="tx1"/>
           </a:solidFill>
@@ -2832,16 +3323,16 @@
           <a:cs typeface="+mn-cs"/>
         </a:defRPr>
       </a:lvl8pPr>
-      <a:lvl9pPr marL="3303270" indent="-194310" algn="l" defTabSz="777240" rtl="0" eaLnBrk="1" latinLnBrk="0" hangingPunct="1">
+      <a:lvl9pPr marL="5440680" indent="-320040" algn="l" defTabSz="1280160" rtl="0" eaLnBrk="1" latinLnBrk="0" hangingPunct="1">
         <a:lnSpc>
           <a:spcPct val="90000"/>
         </a:lnSpc>
         <a:spcBef>
-          <a:spcPts val="425"/>
+          <a:spcPts val="700"/>
         </a:spcBef>
         <a:buFont typeface="Arial" panose="020B0604020202020204" pitchFamily="34" charset="0"/>
         <a:buChar char="•"/>
-        <a:defRPr sz="1530" kern="1200">
+        <a:defRPr sz="2520" kern="1200">
           <a:solidFill>
             <a:schemeClr val="tx1"/>
           </a:solidFill>
@@ -2855,8 +3346,8 @@
       <a:defPPr>
         <a:defRPr lang="en-US"/>
       </a:defPPr>
-      <a:lvl1pPr marL="0" algn="l" defTabSz="777240" rtl="0" eaLnBrk="1" latinLnBrk="0" hangingPunct="1">
-        <a:defRPr sz="1530" kern="1200">
+      <a:lvl1pPr marL="0" algn="l" defTabSz="1280160" rtl="0" eaLnBrk="1" latinLnBrk="0" hangingPunct="1">
+        <a:defRPr sz="2520" kern="1200">
           <a:solidFill>
             <a:schemeClr val="tx1"/>
           </a:solidFill>
@@ -2865,8 +3356,8 @@
           <a:cs typeface="+mn-cs"/>
         </a:defRPr>
       </a:lvl1pPr>
-      <a:lvl2pPr marL="388620" algn="l" defTabSz="777240" rtl="0" eaLnBrk="1" latinLnBrk="0" hangingPunct="1">
-        <a:defRPr sz="1530" kern="1200">
+      <a:lvl2pPr marL="640080" algn="l" defTabSz="1280160" rtl="0" eaLnBrk="1" latinLnBrk="0" hangingPunct="1">
+        <a:defRPr sz="2520" kern="1200">
           <a:solidFill>
             <a:schemeClr val="tx1"/>
           </a:solidFill>
@@ -2875,8 +3366,8 @@
           <a:cs typeface="+mn-cs"/>
         </a:defRPr>
       </a:lvl2pPr>
-      <a:lvl3pPr marL="777240" algn="l" defTabSz="777240" rtl="0" eaLnBrk="1" latinLnBrk="0" hangingPunct="1">
-        <a:defRPr sz="1530" kern="1200">
+      <a:lvl3pPr marL="1280160" algn="l" defTabSz="1280160" rtl="0" eaLnBrk="1" latinLnBrk="0" hangingPunct="1">
+        <a:defRPr sz="2520" kern="1200">
           <a:solidFill>
             <a:schemeClr val="tx1"/>
           </a:solidFill>
@@ -2885,8 +3376,8 @@
           <a:cs typeface="+mn-cs"/>
         </a:defRPr>
       </a:lvl3pPr>
-      <a:lvl4pPr marL="1165860" algn="l" defTabSz="777240" rtl="0" eaLnBrk="1" latinLnBrk="0" hangingPunct="1">
-        <a:defRPr sz="1530" kern="1200">
+      <a:lvl4pPr marL="1920240" algn="l" defTabSz="1280160" rtl="0" eaLnBrk="1" latinLnBrk="0" hangingPunct="1">
+        <a:defRPr sz="2520" kern="1200">
           <a:solidFill>
             <a:schemeClr val="tx1"/>
           </a:solidFill>
@@ -2895,8 +3386,8 @@
           <a:cs typeface="+mn-cs"/>
         </a:defRPr>
       </a:lvl4pPr>
-      <a:lvl5pPr marL="1554480" algn="l" defTabSz="777240" rtl="0" eaLnBrk="1" latinLnBrk="0" hangingPunct="1">
-        <a:defRPr sz="1530" kern="1200">
+      <a:lvl5pPr marL="2560320" algn="l" defTabSz="1280160" rtl="0" eaLnBrk="1" latinLnBrk="0" hangingPunct="1">
+        <a:defRPr sz="2520" kern="1200">
           <a:solidFill>
             <a:schemeClr val="tx1"/>
           </a:solidFill>
@@ -2905,8 +3396,8 @@
           <a:cs typeface="+mn-cs"/>
         </a:defRPr>
       </a:lvl5pPr>
-      <a:lvl6pPr marL="1943100" algn="l" defTabSz="777240" rtl="0" eaLnBrk="1" latinLnBrk="0" hangingPunct="1">
-        <a:defRPr sz="1530" kern="1200">
+      <a:lvl6pPr marL="3200400" algn="l" defTabSz="1280160" rtl="0" eaLnBrk="1" latinLnBrk="0" hangingPunct="1">
+        <a:defRPr sz="2520" kern="1200">
           <a:solidFill>
             <a:schemeClr val="tx1"/>
           </a:solidFill>
@@ -2915,8 +3406,8 @@
           <a:cs typeface="+mn-cs"/>
         </a:defRPr>
       </a:lvl6pPr>
-      <a:lvl7pPr marL="2331720" algn="l" defTabSz="777240" rtl="0" eaLnBrk="1" latinLnBrk="0" hangingPunct="1">
-        <a:defRPr sz="1530" kern="1200">
+      <a:lvl7pPr marL="3840480" algn="l" defTabSz="1280160" rtl="0" eaLnBrk="1" latinLnBrk="0" hangingPunct="1">
+        <a:defRPr sz="2520" kern="1200">
           <a:solidFill>
             <a:schemeClr val="tx1"/>
           </a:solidFill>
@@ -2925,8 +3416,8 @@
           <a:cs typeface="+mn-cs"/>
         </a:defRPr>
       </a:lvl7pPr>
-      <a:lvl8pPr marL="2720340" algn="l" defTabSz="777240" rtl="0" eaLnBrk="1" latinLnBrk="0" hangingPunct="1">
-        <a:defRPr sz="1530" kern="1200">
+      <a:lvl8pPr marL="4480560" algn="l" defTabSz="1280160" rtl="0" eaLnBrk="1" latinLnBrk="0" hangingPunct="1">
+        <a:defRPr sz="2520" kern="1200">
           <a:solidFill>
             <a:schemeClr val="tx1"/>
           </a:solidFill>
@@ -2935,8 +3426,8 @@
           <a:cs typeface="+mn-cs"/>
         </a:defRPr>
       </a:lvl8pPr>
-      <a:lvl9pPr marL="3108960" algn="l" defTabSz="777240" rtl="0" eaLnBrk="1" latinLnBrk="0" hangingPunct="1">
-        <a:defRPr sz="1530" kern="1200">
+      <a:lvl9pPr marL="5120640" algn="l" defTabSz="1280160" rtl="0" eaLnBrk="1" latinLnBrk="0" hangingPunct="1">
+        <a:defRPr sz="2520" kern="1200">
           <a:solidFill>
             <a:schemeClr val="tx1"/>
           </a:solidFill>
@@ -2981,8 +3472,8 @@
         </p:nvSpPr>
         <p:spPr>
           <a:xfrm>
-            <a:off x="0" y="23847"/>
-            <a:ext cx="7772400" cy="1287887"/>
+            <a:off x="0" y="-14509"/>
+            <a:ext cx="12801600" cy="2121225"/>
           </a:xfrm>
           <a:prstGeom prst="rect">
             <a:avLst/>
@@ -3012,7 +3503,7 @@
           <a:lstStyle/>
           <a:p>
             <a:pPr algn="ctr"/>
-            <a:endParaRPr lang="en-US" dirty="0">
+            <a:endParaRPr lang="en-US" sz="2964" dirty="0">
               <a:solidFill>
                 <a:schemeClr val="bg1"/>
               </a:solidFill>
@@ -3034,8 +3525,8 @@
         </p:nvSpPr>
         <p:spPr>
           <a:xfrm>
-            <a:off x="5074276" y="344624"/>
-            <a:ext cx="2470597" cy="646331"/>
+            <a:off x="8240901" y="449869"/>
+            <a:ext cx="4069218" cy="1004634"/>
           </a:xfrm>
           <a:prstGeom prst="rect">
             <a:avLst/>
@@ -3050,7 +3541,7 @@
           <a:p>
             <a:pPr algn="ctr"/>
             <a:r>
-              <a:rPr lang="en-US" dirty="0">
+              <a:rPr lang="en-US" sz="2964" dirty="0">
                 <a:solidFill>
                   <a:schemeClr val="bg1"/>
                 </a:solidFill>
@@ -3074,8 +3565,8 @@
         </p:nvSpPr>
         <p:spPr>
           <a:xfrm>
-            <a:off x="0" y="1287887"/>
-            <a:ext cx="7772400" cy="307777"/>
+            <a:off x="0" y="2067438"/>
+            <a:ext cx="12801600" cy="447174"/>
           </a:xfrm>
           <a:prstGeom prst="rect">
             <a:avLst/>
@@ -3091,12 +3582,12 @@
           <a:lstStyle/>
           <a:p>
             <a:r>
-              <a:rPr lang="en-US" sz="1400" dirty="0">
+              <a:rPr lang="en-US" sz="2306" dirty="0">
                 <a:solidFill>
                   <a:schemeClr val="bg1"/>
                 </a:solidFill>
               </a:rPr>
-              <a:t>About Us                                                                         Instructors	                                      Our Facilities</a:t>
+              <a:t>About Us                                                                       Instructors	                                      Our Facilities</a:t>
             </a:r>
           </a:p>
         </p:txBody>
@@ -3129,8 +3620,8 @@
         </p:blipFill>
         <p:spPr>
           <a:xfrm>
-            <a:off x="535212" y="124866"/>
-            <a:ext cx="2619375" cy="1085850"/>
+            <a:off x="881527" y="151875"/>
+            <a:ext cx="4314264" cy="1788459"/>
           </a:xfrm>
           <a:prstGeom prst="rect">
             <a:avLst/>
@@ -3165,8 +3656,8 @@
         </p:blipFill>
         <p:spPr>
           <a:xfrm>
-            <a:off x="0" y="7969768"/>
-            <a:ext cx="7772400" cy="2387101"/>
+            <a:off x="0" y="13072889"/>
+            <a:ext cx="12801600" cy="3931696"/>
           </a:xfrm>
           <a:prstGeom prst="rect">
             <a:avLst/>
@@ -3187,8 +3678,8 @@
         </p:nvSpPr>
         <p:spPr>
           <a:xfrm>
-            <a:off x="130936" y="8050484"/>
-            <a:ext cx="4170608" cy="1754326"/>
+            <a:off x="215661" y="13205832"/>
+            <a:ext cx="6869236" cy="2829236"/>
           </a:xfrm>
           <a:prstGeom prst="rect">
             <a:avLst/>
@@ -3202,7 +3693,7 @@
           <a:lstStyle/>
           <a:p>
             <a:r>
-              <a:rPr lang="en-US" dirty="0">
+              <a:rPr lang="en-US" sz="2964" dirty="0">
                 <a:solidFill>
                   <a:schemeClr val="bg1"/>
                 </a:solidFill>
@@ -3212,7 +3703,7 @@
           </a:p>
           <a:p>
             <a:r>
-              <a:rPr lang="en-US" dirty="0">
+              <a:rPr lang="en-US" sz="2964" dirty="0">
                 <a:solidFill>
                   <a:schemeClr val="bg1"/>
                 </a:solidFill>
@@ -3222,7 +3713,7 @@
           </a:p>
           <a:p>
             <a:r>
-              <a:rPr lang="en-US" dirty="0">
+              <a:rPr lang="en-US" sz="2964" dirty="0">
                 <a:solidFill>
                   <a:schemeClr val="bg1"/>
                 </a:solidFill>
@@ -3232,17 +3723,17 @@
           </a:p>
           <a:p>
             <a:r>
-              <a:rPr lang="en-US" dirty="0">
+              <a:rPr lang="en-US" sz="2964" dirty="0">
                 <a:solidFill>
                   <a:schemeClr val="bg1"/>
                 </a:solidFill>
               </a:rPr>
-              <a:t>archery-education@example.com</a:t>
-            </a:r>
-          </a:p>
-          <a:p>
-            <a:r>
-              <a:rPr lang="en-US" dirty="0">
+              <a:t>Email Us</a:t>
+            </a:r>
+          </a:p>
+          <a:p>
+            <a:r>
+              <a:rPr lang="en-US" sz="2964" dirty="0">
                 <a:solidFill>
                   <a:schemeClr val="bg1"/>
                 </a:solidFill>
@@ -3251,7 +3742,7 @@
             </a:r>
           </a:p>
           <a:p>
-            <a:endParaRPr lang="en-US" dirty="0">
+            <a:endParaRPr lang="en-US" sz="2964" dirty="0">
               <a:solidFill>
                 <a:schemeClr val="bg1"/>
               </a:solidFill>
@@ -3273,8 +3764,8 @@
         </p:nvSpPr>
         <p:spPr>
           <a:xfrm>
-            <a:off x="1104364" y="1632511"/>
-            <a:ext cx="5808372" cy="307777"/>
+            <a:off x="1617434" y="2514612"/>
+            <a:ext cx="9566731" cy="447174"/>
           </a:xfrm>
           <a:prstGeom prst="rect">
             <a:avLst/>
@@ -3289,7 +3780,7 @@
           <a:p>
             <a:pPr algn="ctr"/>
             <a:r>
-              <a:rPr lang="en-US" sz="1400" dirty="0"/>
+              <a:rPr lang="en-US" sz="2306" dirty="0"/>
               <a:t>Services</a:t>
             </a:r>
           </a:p>
@@ -3309,8 +3800,8 @@
         </p:nvSpPr>
         <p:spPr>
           <a:xfrm>
-            <a:off x="0" y="1916150"/>
-            <a:ext cx="7772400" cy="6093976"/>
+            <a:off x="0" y="2928371"/>
+            <a:ext cx="12801600" cy="10279737"/>
           </a:xfrm>
           <a:prstGeom prst="rect">
             <a:avLst/>
@@ -3324,191 +3815,235 @@
           <a:lstStyle/>
           <a:p>
             <a:r>
-              <a:rPr lang="en-US" sz="1000" dirty="0"/>
-              <a:t>Classes:</a:t>
-            </a:r>
-          </a:p>
-          <a:p>
-            <a:r>
-              <a:rPr lang="en-US" sz="1000" dirty="0"/>
-              <a:t>		Name: A101 Basic Archery</a:t>
-            </a:r>
-          </a:p>
-          <a:p>
-            <a:r>
-              <a:rPr lang="en-US" sz="1000" dirty="0"/>
-              <a:t>		Description: A101 is a basic archery course that focuses on beginning archery safety, skills, and drills. Participants learn about archery form, range rules and etiquette. Form training and fun games are introduced in this class.</a:t>
-            </a:r>
-          </a:p>
-          <a:p>
-            <a:r>
-              <a:rPr lang="en-US" sz="1000" dirty="0"/>
-              <a:t>Equipment will be provided with exception of safety kit.</a:t>
-            </a:r>
-          </a:p>
-          <a:p>
-            <a:r>
-              <a:rPr lang="en-US" sz="1000" dirty="0"/>
-              <a:t>		Cost: $120/month</a:t>
-            </a:r>
-          </a:p>
-          <a:p>
-            <a:r>
-              <a:rPr lang="en-US" sz="1000" dirty="0"/>
-              <a:t>		Schedule: Mondays and Wednesdays, 4-5pm</a:t>
-            </a:r>
-          </a:p>
-          <a:p>
-            <a:r>
-              <a:rPr lang="en-US" sz="1000" dirty="0"/>
-              <a:t>		Prerequisite:   Interest in learning about the sport of archery. Minimum age  8 years old or 7 w/ pre-evaluation.</a:t>
-            </a:r>
-          </a:p>
-          <a:p>
-            <a:endParaRPr lang="en-US" sz="1000" dirty="0"/>
-          </a:p>
-          <a:p>
-            <a:r>
-              <a:rPr lang="en-US" sz="1000" dirty="0"/>
-              <a:t>		Name: A102 Intermediate Archery</a:t>
-            </a:r>
-          </a:p>
-          <a:p>
-            <a:r>
-              <a:rPr lang="en-US" sz="1000" dirty="0"/>
-              <a:t>		Description: A102 is an intermediate archery course that focuses on intermediate archery safety, form, and introduces new equipment styles of shooting Recurve and Compound bows. Fun games and form reinforcement techniques are emphasized in this class.</a:t>
-            </a:r>
-          </a:p>
-          <a:p>
-            <a:r>
-              <a:rPr lang="en-US" sz="1000" dirty="0"/>
-              <a:t>Equipment will be provided with exception of safety kit.</a:t>
-            </a:r>
-          </a:p>
-          <a:p>
-            <a:r>
-              <a:rPr lang="en-US" sz="1000" dirty="0"/>
-              <a:t>		Cost: $120/month</a:t>
-            </a:r>
-          </a:p>
-          <a:p>
-            <a:r>
-              <a:rPr lang="en-US" sz="1000" dirty="0"/>
-              <a:t>		Schedule: Tuesdays and Thursdays, 4-5pm</a:t>
-            </a:r>
-          </a:p>
-          <a:p>
-            <a:r>
-              <a:rPr lang="en-US" sz="1000" dirty="0"/>
-              <a:t>		Prerequisite:A101 or recommendation from private lesson instructor. Minimum age  7 years old.</a:t>
-            </a:r>
-          </a:p>
-          <a:p>
-            <a:endParaRPr lang="en-US" sz="1000" dirty="0"/>
-          </a:p>
-          <a:p>
-            <a:r>
-              <a:rPr lang="en-US" sz="1000" dirty="0"/>
-              <a:t>		Name: A103 Advanced Archery</a:t>
-            </a:r>
-          </a:p>
-          <a:p>
-            <a:r>
-              <a:rPr lang="en-US" sz="1000" dirty="0"/>
-              <a:t>		Description: After taking the A101, A102 classes, students are eligible to participate in the A103 class. This class focuses on a continued education towards tournament styles of shooting used by many archery tournament associations from around the world. Along with the tournament lesson, participants receive continued knowledge around their shooting form and advice on personal equipment selections.</a:t>
-            </a:r>
-          </a:p>
-          <a:p>
-            <a:r>
-              <a:rPr lang="en-US" sz="1000" dirty="0"/>
-              <a:t>Equipment will be provided with exception of safety kit.</a:t>
-            </a:r>
-          </a:p>
-          <a:p>
-            <a:r>
-              <a:rPr lang="en-US" sz="1000" dirty="0"/>
-              <a:t>		Cost: $120/month</a:t>
-            </a:r>
-          </a:p>
-          <a:p>
-            <a:r>
-              <a:rPr lang="en-US" sz="1000" dirty="0"/>
-              <a:t>		Schedule: Tuesdays and Thursdays, 5-6pm</a:t>
-            </a:r>
-          </a:p>
-          <a:p>
-            <a:r>
-              <a:rPr lang="en-US" sz="1000" dirty="0"/>
-              <a:t>		Prerequisite:  A101/A102 or equivalent. Minimum age  7 years old.</a:t>
-            </a:r>
-          </a:p>
-          <a:p>
-            <a:endParaRPr lang="en-US" sz="1000" dirty="0"/>
-          </a:p>
-          <a:p>
-            <a:r>
-              <a:rPr lang="en-US" sz="1000" dirty="0"/>
-              <a:t>Private Lessons:</a:t>
-            </a:r>
-          </a:p>
-          <a:p>
-            <a:r>
-              <a:rPr lang="en-US" sz="1000" dirty="0"/>
-              <a:t>		Type: Single Lesson</a:t>
-            </a:r>
-          </a:p>
-          <a:p>
-            <a:r>
-              <a:rPr lang="en-US" sz="1000" dirty="0"/>
-              <a:t>		Description: 1 hour of expert guidance by a USA Archery-certified coach</a:t>
-            </a:r>
-          </a:p>
-          <a:p>
-            <a:r>
-              <a:rPr lang="en-US" sz="1000" dirty="0"/>
-              <a:t>		Price: $50</a:t>
-            </a:r>
-          </a:p>
-          <a:p>
-            <a:endParaRPr lang="en-US" sz="1000" dirty="0"/>
-          </a:p>
-          <a:p>
-            <a:r>
-              <a:rPr lang="en-US" sz="1000" dirty="0"/>
-              <a:t>		Type: 3 Lesson Package</a:t>
-            </a:r>
-          </a:p>
-          <a:p>
-            <a:r>
-              <a:rPr lang="en-US" sz="1000" dirty="0"/>
-              <a:t>		Description: 3 lessons, 1 hour each of expert guidance by a USA Archery-certified coach</a:t>
-            </a:r>
-          </a:p>
-          <a:p>
-            <a:r>
-              <a:rPr lang="en-US" sz="1000" dirty="0"/>
-              <a:t>		Price: $140</a:t>
-            </a:r>
-          </a:p>
-          <a:p>
-            <a:endParaRPr lang="en-US" sz="1000" dirty="0"/>
-          </a:p>
-          <a:p>
-            <a:r>
-              <a:rPr lang="en-US" sz="1000" dirty="0"/>
-              <a:t>		Type: 10 Lesson Package</a:t>
-            </a:r>
-          </a:p>
-          <a:p>
-            <a:r>
-              <a:rPr lang="en-US" sz="1000" dirty="0"/>
-              <a:t>		Description: 10 lessons, 1 hour each of expert guidance by a USA Archery-certified coach</a:t>
-            </a:r>
-          </a:p>
-          <a:p>
-            <a:r>
-              <a:rPr lang="en-US" sz="1000" dirty="0"/>
-              <a:t>		Price: $380</a:t>
+              <a:rPr lang="en-US" sz="1400" b="1" dirty="0"/>
+              <a:t>													   </a:t>
+            </a:r>
+            <a:r>
+              <a:rPr lang="en-US" sz="1600" b="1" dirty="0"/>
+              <a:t>Classes</a:t>
+            </a:r>
+          </a:p>
+          <a:p>
+            <a:r>
+              <a:rPr lang="en-US" sz="1400" b="1" dirty="0"/>
+              <a:t>A101 Basic Archery</a:t>
+            </a:r>
+          </a:p>
+          <a:p>
+            <a:endParaRPr lang="en-US" sz="1400" b="1" dirty="0"/>
+          </a:p>
+          <a:p>
+            <a:r>
+              <a:rPr lang="en-US" sz="1400" dirty="0"/>
+              <a:t>A101 is a basic archery course that focuses on beginning archery safety, skills, and drills. Participants learn about archery form, range rules and etiquette. Form training and fun games are introduced in this class. Equipment will be provided with exception of safety kit.</a:t>
+            </a:r>
+          </a:p>
+          <a:p>
+            <a:r>
+              <a:rPr lang="en-US" sz="1400" dirty="0"/>
+              <a:t>		</a:t>
+            </a:r>
+          </a:p>
+          <a:p>
+            <a:r>
+              <a:rPr lang="en-US" sz="1400" dirty="0"/>
+              <a:t>Cost: $120/month</a:t>
+            </a:r>
+          </a:p>
+          <a:p>
+            <a:r>
+              <a:rPr lang="en-US" sz="1400" dirty="0"/>
+              <a:t>		</a:t>
+            </a:r>
+          </a:p>
+          <a:p>
+            <a:r>
+              <a:rPr lang="en-US" sz="1400" dirty="0"/>
+              <a:t>Schedule: Mondays and Wednesdays, 4-5pm</a:t>
+            </a:r>
+          </a:p>
+          <a:p>
+            <a:r>
+              <a:rPr lang="en-US" sz="1400" dirty="0"/>
+              <a:t>		</a:t>
+            </a:r>
+          </a:p>
+          <a:p>
+            <a:r>
+              <a:rPr lang="en-US" sz="1400" dirty="0"/>
+              <a:t>Prerequisite:   Interest in learning about the sport of archery. Minimum age  8 years old or 7 w/ pre-evaluation.</a:t>
+            </a:r>
+          </a:p>
+          <a:p>
+            <a:endParaRPr lang="en-US" sz="1400" dirty="0"/>
+          </a:p>
+          <a:p>
+            <a:r>
+              <a:rPr lang="en-US" sz="1400" b="1" dirty="0"/>
+              <a:t>A102 Intermediate Archery</a:t>
+            </a:r>
+          </a:p>
+          <a:p>
+            <a:endParaRPr lang="en-US" sz="1400" b="1" dirty="0"/>
+          </a:p>
+          <a:p>
+            <a:r>
+              <a:rPr lang="en-US" sz="1400" dirty="0"/>
+              <a:t>A102 is an intermediate archery course that focuses on intermediate archery safety, form, and introduces new equipment styles of shooting Recurve and Compound bows. Fun games and form reinforcement techniques are emphasized in this class. Equipment will be provided with exception of safety kit.</a:t>
+            </a:r>
+          </a:p>
+          <a:p>
+            <a:r>
+              <a:rPr lang="en-US" sz="1400" dirty="0"/>
+              <a:t>		</a:t>
+            </a:r>
+          </a:p>
+          <a:p>
+            <a:r>
+              <a:rPr lang="en-US" sz="1400" dirty="0"/>
+              <a:t>Cost: $120/month</a:t>
+            </a:r>
+          </a:p>
+          <a:p>
+            <a:r>
+              <a:rPr lang="en-US" sz="1400" dirty="0"/>
+              <a:t>		</a:t>
+            </a:r>
+          </a:p>
+          <a:p>
+            <a:r>
+              <a:rPr lang="en-US" sz="1400" dirty="0"/>
+              <a:t>Schedule: Tuesdays and Thursdays, 4-5pm</a:t>
+            </a:r>
+          </a:p>
+          <a:p>
+            <a:r>
+              <a:rPr lang="en-US" sz="1400" dirty="0"/>
+              <a:t>		</a:t>
+            </a:r>
+          </a:p>
+          <a:p>
+            <a:r>
+              <a:rPr lang="en-US" sz="1400" dirty="0"/>
+              <a:t>Prerequisite:A101 or recommendation from private lesson instructor. Minimum age  7 years old.</a:t>
+            </a:r>
+          </a:p>
+          <a:p>
+            <a:endParaRPr lang="en-US" sz="1400" b="1" dirty="0"/>
+          </a:p>
+          <a:p>
+            <a:r>
+              <a:rPr lang="en-US" sz="1400" b="1" dirty="0"/>
+              <a:t>A103 Advanced Archery</a:t>
+            </a:r>
+          </a:p>
+          <a:p>
+            <a:r>
+              <a:rPr lang="en-US" sz="1400" dirty="0"/>
+              <a:t>		</a:t>
+            </a:r>
+          </a:p>
+          <a:p>
+            <a:r>
+              <a:rPr lang="en-US" sz="1400" dirty="0"/>
+              <a:t>After taking the A101, A102 classes, students are eligible to participate in the A103 class. This class focuses on a continued education towards tournament styles of shooting used by many archery tournament associations from around the world. Along with the tournament lesson, participants receive continued knowledge around their shooting form and advice on personal equipment selections. Equipment will be provided with exception of safety kit.</a:t>
+            </a:r>
+          </a:p>
+          <a:p>
+            <a:endParaRPr lang="en-US" sz="1400" dirty="0"/>
+          </a:p>
+          <a:p>
+            <a:r>
+              <a:rPr lang="en-US" sz="1400" dirty="0"/>
+              <a:t>Cost: $120/month</a:t>
+            </a:r>
+          </a:p>
+          <a:p>
+            <a:endParaRPr lang="en-US" sz="1400" dirty="0"/>
+          </a:p>
+          <a:p>
+            <a:r>
+              <a:rPr lang="en-US" sz="1400" dirty="0"/>
+              <a:t>Schedule: Tuesdays and Thursdays, 5-6pm</a:t>
+            </a:r>
+          </a:p>
+          <a:p>
+            <a:endParaRPr lang="en-US" sz="1400" dirty="0"/>
+          </a:p>
+          <a:p>
+            <a:r>
+              <a:rPr lang="en-US" sz="1400" dirty="0"/>
+              <a:t>Prerequisite:  A101/A102 or equivalent. Minimum age  7 years old.</a:t>
+            </a:r>
+          </a:p>
+          <a:p>
+            <a:endParaRPr lang="en-US" sz="1400" dirty="0"/>
+          </a:p>
+          <a:p>
+            <a:r>
+              <a:rPr lang="en-US" sz="1600" b="1" dirty="0"/>
+              <a:t>												Private Lessons</a:t>
+            </a:r>
+            <a:endParaRPr lang="en-US" sz="1600" dirty="0"/>
+          </a:p>
+          <a:p>
+            <a:r>
+              <a:rPr lang="en-US" sz="1400" b="1" dirty="0"/>
+              <a:t>Single Lesson</a:t>
+            </a:r>
+          </a:p>
+          <a:p>
+            <a:r>
+              <a:rPr lang="en-US" sz="1400" dirty="0"/>
+              <a:t>1 hour of expert guidance by a USA Archery-certified coach</a:t>
+            </a:r>
+          </a:p>
+          <a:p>
+            <a:r>
+              <a:rPr lang="en-US" sz="1400" dirty="0"/>
+              <a:t>Price: $50</a:t>
+            </a:r>
+          </a:p>
+          <a:p>
+            <a:endParaRPr lang="en-US" sz="1400" dirty="0"/>
+          </a:p>
+          <a:p>
+            <a:r>
+              <a:rPr lang="en-US" sz="1400" b="1" dirty="0"/>
+              <a:t>3 Lesson Package</a:t>
+            </a:r>
+          </a:p>
+          <a:p>
+            <a:r>
+              <a:rPr lang="en-US" sz="1400" dirty="0"/>
+              <a:t>3 lessons, 1 hour each of expert guidance by a USA Archery-certified coach</a:t>
+            </a:r>
+          </a:p>
+          <a:p>
+            <a:r>
+              <a:rPr lang="en-US" sz="1400" dirty="0"/>
+              <a:t>Price: $140</a:t>
+            </a:r>
+          </a:p>
+          <a:p>
+            <a:endParaRPr lang="en-US" sz="1400" dirty="0"/>
+          </a:p>
+          <a:p>
+            <a:r>
+              <a:rPr lang="en-US" sz="1400" b="1" dirty="0"/>
+              <a:t>10 Lesson Package</a:t>
+            </a:r>
+          </a:p>
+          <a:p>
+            <a:r>
+              <a:rPr lang="en-US" sz="1400" dirty="0"/>
+              <a:t>10 lessons, 1 hour each of expert guidance by a USA Archery-certified coach</a:t>
+            </a:r>
+          </a:p>
+          <a:p>
+            <a:r>
+              <a:rPr lang="en-US" sz="1400" dirty="0"/>
+              <a:t>Price: $380</a:t>
             </a:r>
           </a:p>
         </p:txBody>
@@ -3557,8 +4092,8 @@
         </p:nvSpPr>
         <p:spPr>
           <a:xfrm>
-            <a:off x="0" y="23847"/>
-            <a:ext cx="7772400" cy="1287887"/>
+            <a:off x="0" y="-14509"/>
+            <a:ext cx="12801600" cy="2121225"/>
           </a:xfrm>
           <a:prstGeom prst="rect">
             <a:avLst/>
@@ -3588,7 +4123,7 @@
           <a:lstStyle/>
           <a:p>
             <a:pPr algn="ctr"/>
-            <a:endParaRPr lang="en-US" dirty="0">
+            <a:endParaRPr lang="en-US" sz="2964" dirty="0">
               <a:solidFill>
                 <a:schemeClr val="bg1"/>
               </a:solidFill>
@@ -3610,8 +4145,8 @@
         </p:nvSpPr>
         <p:spPr>
           <a:xfrm>
-            <a:off x="5074276" y="344624"/>
-            <a:ext cx="2470597" cy="646331"/>
+            <a:off x="8490208" y="496935"/>
+            <a:ext cx="4069218" cy="1004634"/>
           </a:xfrm>
           <a:prstGeom prst="rect">
             <a:avLst/>
@@ -3626,7 +4161,7 @@
           <a:p>
             <a:pPr algn="ctr"/>
             <a:r>
-              <a:rPr lang="en-US" dirty="0">
+              <a:rPr lang="en-US" sz="2964" dirty="0">
                 <a:solidFill>
                   <a:schemeClr val="bg1"/>
                 </a:solidFill>
@@ -3650,8 +4185,8 @@
         </p:nvSpPr>
         <p:spPr>
           <a:xfrm>
-            <a:off x="0" y="1287887"/>
-            <a:ext cx="7772400" cy="307777"/>
+            <a:off x="0" y="2067438"/>
+            <a:ext cx="12801600" cy="447174"/>
           </a:xfrm>
           <a:prstGeom prst="rect">
             <a:avLst/>
@@ -3667,7 +4202,7 @@
           <a:lstStyle/>
           <a:p>
             <a:r>
-              <a:rPr lang="en-US" sz="1400" dirty="0">
+              <a:rPr lang="en-US" sz="2306" dirty="0">
                 <a:solidFill>
                   <a:schemeClr val="bg1"/>
                 </a:solidFill>
@@ -3705,8 +4240,8 @@
         </p:blipFill>
         <p:spPr>
           <a:xfrm>
-            <a:off x="535212" y="124866"/>
-            <a:ext cx="2619375" cy="1085850"/>
+            <a:off x="881527" y="151875"/>
+            <a:ext cx="4314264" cy="1788459"/>
           </a:xfrm>
           <a:prstGeom prst="rect">
             <a:avLst/>
@@ -3741,8 +4276,8 @@
         </p:blipFill>
         <p:spPr>
           <a:xfrm>
-            <a:off x="0" y="7969768"/>
-            <a:ext cx="7772400" cy="2387101"/>
+            <a:off x="0" y="13072889"/>
+            <a:ext cx="12801600" cy="3931696"/>
           </a:xfrm>
           <a:prstGeom prst="rect">
             <a:avLst/>
@@ -3763,8 +4298,8 @@
         </p:nvSpPr>
         <p:spPr>
           <a:xfrm>
-            <a:off x="130936" y="8050484"/>
-            <a:ext cx="4170608" cy="1754326"/>
+            <a:off x="215661" y="13205832"/>
+            <a:ext cx="6869236" cy="2829236"/>
           </a:xfrm>
           <a:prstGeom prst="rect">
             <a:avLst/>
@@ -3778,7 +4313,7 @@
           <a:lstStyle/>
           <a:p>
             <a:r>
-              <a:rPr lang="en-US" dirty="0">
+              <a:rPr lang="en-US" sz="2964" dirty="0">
                 <a:solidFill>
                   <a:schemeClr val="bg1"/>
                 </a:solidFill>
@@ -3788,7 +4323,7 @@
           </a:p>
           <a:p>
             <a:r>
-              <a:rPr lang="en-US" dirty="0">
+              <a:rPr lang="en-US" sz="2964" dirty="0">
                 <a:solidFill>
                   <a:schemeClr val="bg1"/>
                 </a:solidFill>
@@ -3798,7 +4333,7 @@
           </a:p>
           <a:p>
             <a:r>
-              <a:rPr lang="en-US" dirty="0">
+              <a:rPr lang="en-US" sz="2964" dirty="0">
                 <a:solidFill>
                   <a:schemeClr val="bg1"/>
                 </a:solidFill>
@@ -3808,17 +4343,17 @@
           </a:p>
           <a:p>
             <a:r>
-              <a:rPr lang="en-US" dirty="0">
+              <a:rPr lang="en-US" sz="2964" dirty="0">
                 <a:solidFill>
                   <a:schemeClr val="bg1"/>
                 </a:solidFill>
               </a:rPr>
-              <a:t>archery-education@example.com</a:t>
-            </a:r>
-          </a:p>
-          <a:p>
-            <a:r>
-              <a:rPr lang="en-US" dirty="0">
+              <a:t>Email Us</a:t>
+            </a:r>
+          </a:p>
+          <a:p>
+            <a:r>
+              <a:rPr lang="en-US" sz="2964" dirty="0">
                 <a:solidFill>
                   <a:schemeClr val="bg1"/>
                 </a:solidFill>
@@ -3827,7 +4362,7 @@
             </a:r>
           </a:p>
           <a:p>
-            <a:endParaRPr lang="en-US" dirty="0">
+            <a:endParaRPr lang="en-US" sz="2964" dirty="0">
               <a:solidFill>
                 <a:schemeClr val="bg1"/>
               </a:solidFill>
@@ -3863,8 +4398,8 @@
         </p:blipFill>
         <p:spPr>
           <a:xfrm>
-            <a:off x="419636" y="2299857"/>
-            <a:ext cx="1905000" cy="1905000"/>
+            <a:off x="691169" y="3734215"/>
+            <a:ext cx="3137647" cy="3137647"/>
           </a:xfrm>
           <a:prstGeom prst="rect">
             <a:avLst/>
@@ -3899,8 +4434,8 @@
         </p:blipFill>
         <p:spPr>
           <a:xfrm>
-            <a:off x="3056050" y="2232506"/>
-            <a:ext cx="1905000" cy="1905000"/>
+            <a:off x="5033498" y="3623285"/>
+            <a:ext cx="3137647" cy="3137647"/>
           </a:xfrm>
           <a:prstGeom prst="rect">
             <a:avLst/>
@@ -3935,8 +4470,8 @@
         </p:blipFill>
         <p:spPr>
           <a:xfrm>
-            <a:off x="5742904" y="2192873"/>
-            <a:ext cx="1905000" cy="1905000"/>
+            <a:off x="9458904" y="3558006"/>
+            <a:ext cx="3137647" cy="3137647"/>
           </a:xfrm>
           <a:prstGeom prst="rect">
             <a:avLst/>
@@ -3957,8 +4492,8 @@
         </p:nvSpPr>
         <p:spPr>
           <a:xfrm>
-            <a:off x="2862330" y="4578430"/>
-            <a:ext cx="2292439" cy="3323987"/>
+            <a:off x="4714426" y="7487155"/>
+            <a:ext cx="3775782" cy="5414944"/>
           </a:xfrm>
           <a:prstGeom prst="rect">
             <a:avLst/>
@@ -3973,16 +4508,15 @@
           <a:p>
             <a:pPr algn="ctr"/>
             <a:r>
-              <a:rPr lang="en-US" sz="1400" b="0" i="0" dirty="0">
+              <a:rPr lang="en-US" sz="2306" dirty="0">
                 <a:solidFill>
                   <a:srgbClr val="24292F"/>
                 </a:solidFill>
-                <a:effectLst/>
                 <a:latin typeface="ui-monospace"/>
               </a:rPr>
               <a:t>Derek Jenkins: Derek is a Washington native and an experienced outdoorsman with many years hunting, fishing, skiing, canoeing, archery, shooting and minimalistic camping. His skillful mastery of bushcraft and wilderness survival knowledge helps define his character. He enjoys handcrafting his own long bows, flint knapped primitive arrows and making custom leather products.</a:t>
             </a:r>
-            <a:endParaRPr lang="en-US" sz="1400" dirty="0"/>
+            <a:endParaRPr lang="en-US" sz="2306" dirty="0"/>
           </a:p>
         </p:txBody>
       </p:sp>
@@ -4000,8 +4534,8 @@
         </p:nvSpPr>
         <p:spPr>
           <a:xfrm>
-            <a:off x="284408" y="4514716"/>
-            <a:ext cx="2292439" cy="2677656"/>
+            <a:off x="468438" y="7382217"/>
+            <a:ext cx="3775782" cy="4350422"/>
           </a:xfrm>
           <a:prstGeom prst="rect">
             <a:avLst/>
@@ -4016,16 +4550,15 @@
           <a:p>
             <a:pPr algn="ctr"/>
             <a:r>
-              <a:rPr lang="en-US" sz="1400" b="0" i="0" dirty="0">
+              <a:rPr lang="en-US" sz="2306" dirty="0">
                 <a:solidFill>
                   <a:srgbClr val="24292F"/>
                 </a:solidFill>
-                <a:effectLst/>
                 <a:latin typeface="ui-monospace"/>
               </a:rPr>
               <a:t>Amy Smith: Amy truly has a passion for archery. She comes from a long line of hunters, fisherman, and trappers of Canada. Amy places a strong emphasis on safety and is enthusiastic about teaching. Amy also loves fitness, and has been a YMCA group exercise and personal trainer for over 18 years.</a:t>
             </a:r>
-            <a:endParaRPr lang="en-US" sz="1400" dirty="0"/>
+            <a:endParaRPr lang="en-US" sz="2306" dirty="0"/>
           </a:p>
         </p:txBody>
       </p:sp>
@@ -4043,8 +4576,8 @@
         </p:nvSpPr>
         <p:spPr>
           <a:xfrm>
-            <a:off x="5355465" y="4514716"/>
-            <a:ext cx="2292439" cy="2893100"/>
+            <a:off x="8820766" y="7382216"/>
+            <a:ext cx="3775782" cy="4705262"/>
           </a:xfrm>
           <a:prstGeom prst="rect">
             <a:avLst/>
@@ -4059,11 +4592,10 @@
           <a:p>
             <a:pPr algn="ctr"/>
             <a:r>
-              <a:rPr lang="en-US" sz="1400" b="0" i="0" dirty="0">
+              <a:rPr lang="en-US" sz="2306" dirty="0">
                 <a:solidFill>
                   <a:srgbClr val="24292F"/>
                 </a:solidFill>
-                <a:effectLst/>
                 <a:latin typeface="ui-monospace"/>
               </a:rPr>
               <a:t>Nathan Lee: Nathan is an USA Archery Certified Level 3 NTS – Coach and has been teaching archery since 2009. He has been interested in archery since he nocked his first arrow while a Boy Scout at Scout camp. Nathan has many years of experience teaching people of all ages, experience gained as a Martial Arts Instructor and Studio Manager.</a:t>
@@ -4087,8 +4619,8 @@
         </p:nvSpPr>
         <p:spPr bwMode="auto">
           <a:xfrm>
-            <a:off x="3863975" y="2671763"/>
-            <a:ext cx="7772400" cy="0"/>
+            <a:off x="6364195" y="3814575"/>
+            <a:ext cx="304220" cy="1064378"/>
           </a:xfrm>
           <a:prstGeom prst="rect">
             <a:avLst/>
@@ -4128,7 +4660,7 @@
           </a:extLst>
         </p:spPr>
         <p:txBody>
-          <a:bodyPr vert="horz" wrap="none" lIns="91440" tIns="45720" rIns="91440" bIns="45720" numCol="1" anchor="ctr" anchorCtr="0" compatLnSpc="1">
+          <a:bodyPr vert="horz" wrap="none" lIns="150607" tIns="75303" rIns="150607" bIns="75303" numCol="1" anchor="ctr" anchorCtr="0" compatLnSpc="1">
             <a:prstTxWarp prst="textNoShape">
               <a:avLst/>
             </a:prstTxWarp>
@@ -4136,44 +4668,58 @@
           </a:bodyPr>
           <a:lstStyle/>
           <a:p>
-            <a:pPr marL="0" marR="0" lvl="0" indent="0" algn="l" defTabSz="914400" rtl="0" eaLnBrk="0" fontAlgn="base" latinLnBrk="0" hangingPunct="0">
-              <a:lnSpc>
-                <a:spcPct val="100000"/>
-              </a:lnSpc>
+            <a:pPr defTabSz="1505981" eaLnBrk="0" fontAlgn="base" hangingPunct="0">
               <a:spcBef>
                 <a:spcPct val="0"/>
               </a:spcBef>
               <a:spcAft>
                 <a:spcPct val="0"/>
               </a:spcAft>
-              <a:buClrTx/>
-              <a:buSzTx/>
-              <a:buFontTx/>
-              <a:buNone/>
-              <a:tabLst/>
             </a:pPr>
             <a:br>
-              <a:rPr kumimoji="0" lang="en-US" altLang="en-US" sz="1800" b="0" i="0" u="none" strike="noStrike" cap="none" normalizeH="0" baseline="0">
-                <a:ln>
-                  <a:noFill/>
-                </a:ln>
-                <a:solidFill>
-                  <a:schemeClr val="tx1"/>
-                </a:solidFill>
-                <a:effectLst/>
+              <a:rPr lang="en-US" altLang="en-US" sz="2964">
                 <a:latin typeface="Arial" panose="020B0604020202020204" pitchFamily="34" charset="0"/>
               </a:rPr>
             </a:br>
-            <a:endParaRPr kumimoji="0" lang="en-US" altLang="en-US" sz="1800" b="0" i="0" u="none" strike="noStrike" cap="none" normalizeH="0" baseline="0">
-              <a:ln>
-                <a:noFill/>
-              </a:ln>
-              <a:solidFill>
-                <a:schemeClr val="tx1"/>
-              </a:solidFill>
-              <a:effectLst/>
+            <a:endParaRPr lang="en-US" altLang="en-US" sz="2964">
               <a:latin typeface="Arial" panose="020B0604020202020204" pitchFamily="34" charset="0"/>
             </a:endParaRPr>
+          </a:p>
+        </p:txBody>
+      </p:sp>
+      <p:sp>
+        <p:nvSpPr>
+          <p:cNvPr id="2" name="TextBox 1">
+            <a:extLst>
+              <a:ext uri="{FF2B5EF4-FFF2-40B4-BE49-F238E27FC236}">
+                <a16:creationId xmlns:a16="http://schemas.microsoft.com/office/drawing/2014/main" id="{5824D8EC-1DB1-48BE-9FAF-38859149250B}"/>
+              </a:ext>
+            </a:extLst>
+          </p:cNvPr>
+          <p:cNvSpPr txBox="1"/>
+          <p:nvPr/>
+        </p:nvSpPr>
+        <p:spPr>
+          <a:xfrm>
+            <a:off x="5033497" y="2810623"/>
+            <a:ext cx="3324137" cy="548483"/>
+          </a:xfrm>
+          <a:prstGeom prst="rect">
+            <a:avLst/>
+          </a:prstGeom>
+          <a:noFill/>
+        </p:spPr>
+        <p:txBody>
+          <a:bodyPr wrap="square" rtlCol="0">
+            <a:spAutoFit/>
+          </a:bodyPr>
+          <a:lstStyle/>
+          <a:p>
+            <a:pPr algn="ctr"/>
+            <a:r>
+              <a:rPr lang="en-US" sz="2964" dirty="0"/>
+              <a:t>Our Instructors</a:t>
+            </a:r>
           </a:p>
         </p:txBody>
       </p:sp>

</xml_diff>